<commit_message>
merged input from Ahmed
</commit_message>
<xml_diff>
--- a/117/Side-Meetings/ietf117-netconf-yang-push-data-mesh-integration.pptx
+++ b/117/Side-Meetings/ietf117-netconf-yang-push-data-mesh-integration.pptx
@@ -5,7 +5,7 @@
     <p:sldMasterId id="2147483648" r:id="rId1"/>
   </p:sldMasterIdLst>
   <p:notesMasterIdLst>
-    <p:notesMasterId r:id="rId27"/>
+    <p:notesMasterId r:id="rId28"/>
   </p:notesMasterIdLst>
   <p:sldIdLst>
     <p:sldId id="1041" r:id="rId2"/>
@@ -17,22 +17,23 @@
     <p:sldId id="2145706234" r:id="rId8"/>
     <p:sldId id="2145706235" r:id="rId9"/>
     <p:sldId id="2145706229" r:id="rId10"/>
-    <p:sldId id="2145706225" r:id="rId11"/>
-    <p:sldId id="2145706236" r:id="rId12"/>
-    <p:sldId id="2145706228" r:id="rId13"/>
-    <p:sldId id="2145706237" r:id="rId14"/>
-    <p:sldId id="26417" r:id="rId15"/>
-    <p:sldId id="26421" r:id="rId16"/>
-    <p:sldId id="26420" r:id="rId17"/>
-    <p:sldId id="26422" r:id="rId18"/>
-    <p:sldId id="26419" r:id="rId19"/>
-    <p:sldId id="2145706200" r:id="rId20"/>
-    <p:sldId id="26423" r:id="rId21"/>
-    <p:sldId id="26418" r:id="rId22"/>
-    <p:sldId id="2145706224" r:id="rId23"/>
-    <p:sldId id="2145706227" r:id="rId24"/>
-    <p:sldId id="26413" r:id="rId25"/>
-    <p:sldId id="26415" r:id="rId26"/>
+    <p:sldId id="2145706240" r:id="rId11"/>
+    <p:sldId id="2145706225" r:id="rId12"/>
+    <p:sldId id="2145706236" r:id="rId13"/>
+    <p:sldId id="2145706228" r:id="rId14"/>
+    <p:sldId id="2145706237" r:id="rId15"/>
+    <p:sldId id="26417" r:id="rId16"/>
+    <p:sldId id="26421" r:id="rId17"/>
+    <p:sldId id="26420" r:id="rId18"/>
+    <p:sldId id="26422" r:id="rId19"/>
+    <p:sldId id="26419" r:id="rId20"/>
+    <p:sldId id="2145706200" r:id="rId21"/>
+    <p:sldId id="26423" r:id="rId22"/>
+    <p:sldId id="26418" r:id="rId23"/>
+    <p:sldId id="2145706224" r:id="rId24"/>
+    <p:sldId id="2145706227" r:id="rId25"/>
+    <p:sldId id="26413" r:id="rId26"/>
+    <p:sldId id="26415" r:id="rId27"/>
   </p:sldIdLst>
   <p:sldSz cx="12192000" cy="6858000"/>
   <p:notesSz cx="6858000" cy="9144000"/>
@@ -142,7 +143,7 @@
 <file path=ppt/revisionInfo.xml><?xml version="1.0" encoding="utf-8"?>
 <p1510:revInfo xmlns:a="http://schemas.openxmlformats.org/drawingml/2006/main" xmlns:r="http://schemas.openxmlformats.org/officeDocument/2006/relationships" xmlns:p1510="http://schemas.microsoft.com/office/powerpoint/2015/10/main">
   <p1510:revLst>
-    <p1510:client id="{40188488-A9E1-4155-BFF1-5EF2EE12E93E}" v="41" dt="2023-07-24T15:12:24.086"/>
+    <p1510:client id="{40188488-A9E1-4155-BFF1-5EF2EE12E93E}" v="43" dt="2023-07-24T17:15:33.382"/>
   </p1510:revLst>
 </p1510:revInfo>
 </file>
@@ -152,7 +153,7 @@
   <pc:docChgLst>
     <pc:chgData name="Graf Thomas, INI-NET-VNC-HCS" userId="487bc3e3-9ce7-4cdd-b7b4-8899ea88d289" providerId="ADAL" clId="{40188488-A9E1-4155-BFF1-5EF2EE12E93E}"/>
     <pc:docChg chg="undo custSel addSld delSld modSld sldOrd">
-      <pc:chgData name="Graf Thomas, INI-NET-VNC-HCS" userId="487bc3e3-9ce7-4cdd-b7b4-8899ea88d289" providerId="ADAL" clId="{40188488-A9E1-4155-BFF1-5EF2EE12E93E}" dt="2023-07-24T15:12:24.101" v="2372"/>
+      <pc:chgData name="Graf Thomas, INI-NET-VNC-HCS" userId="487bc3e3-9ce7-4cdd-b7b4-8899ea88d289" providerId="ADAL" clId="{40188488-A9E1-4155-BFF1-5EF2EE12E93E}" dt="2023-07-24T17:16:36.535" v="2446" actId="47"/>
       <pc:docMkLst>
         <pc:docMk/>
       </pc:docMkLst>
@@ -311,8 +312,8 @@
           <pc:sldMk cId="1339609138" sldId="2145706228"/>
         </pc:sldMkLst>
       </pc:sldChg>
-      <pc:sldChg chg="modSp add mod ord">
-        <pc:chgData name="Graf Thomas, INI-NET-VNC-HCS" userId="487bc3e3-9ce7-4cdd-b7b4-8899ea88d289" providerId="ADAL" clId="{40188488-A9E1-4155-BFF1-5EF2EE12E93E}" dt="2023-07-24T15:11:58.655" v="2369" actId="20577"/>
+      <pc:sldChg chg="addSp delSp modSp add mod ord">
+        <pc:chgData name="Graf Thomas, INI-NET-VNC-HCS" userId="487bc3e3-9ce7-4cdd-b7b4-8899ea88d289" providerId="ADAL" clId="{40188488-A9E1-4155-BFF1-5EF2EE12E93E}" dt="2023-07-24T17:15:42.799" v="2384" actId="6549"/>
         <pc:sldMkLst>
           <pc:docMk/>
           <pc:sldMk cId="505743577" sldId="2145706229"/>
@@ -326,15 +327,23 @@
           </ac:spMkLst>
         </pc:spChg>
         <pc:spChg chg="mod">
-          <ac:chgData name="Graf Thomas, INI-NET-VNC-HCS" userId="487bc3e3-9ce7-4cdd-b7b4-8899ea88d289" providerId="ADAL" clId="{40188488-A9E1-4155-BFF1-5EF2EE12E93E}" dt="2023-07-24T15:11:58.655" v="2369" actId="20577"/>
+          <ac:chgData name="Graf Thomas, INI-NET-VNC-HCS" userId="487bc3e3-9ce7-4cdd-b7b4-8899ea88d289" providerId="ADAL" clId="{40188488-A9E1-4155-BFF1-5EF2EE12E93E}" dt="2023-07-24T17:15:42.799" v="2384" actId="6549"/>
           <ac:spMkLst>
             <pc:docMk/>
             <pc:sldMk cId="505743577" sldId="2145706229"/>
             <ac:spMk id="3" creationId="{29C0DFD4-432D-4B0C-93DF-790441DCF5B9}"/>
           </ac:spMkLst>
         </pc:spChg>
-        <pc:spChg chg="mod">
-          <ac:chgData name="Graf Thomas, INI-NET-VNC-HCS" userId="487bc3e3-9ce7-4cdd-b7b4-8899ea88d289" providerId="ADAL" clId="{40188488-A9E1-4155-BFF1-5EF2EE12E93E}" dt="2023-07-24T15:11:41.637" v="2367" actId="27636"/>
+        <pc:spChg chg="add mod">
+          <ac:chgData name="Graf Thomas, INI-NET-VNC-HCS" userId="487bc3e3-9ce7-4cdd-b7b4-8899ea88d289" providerId="ADAL" clId="{40188488-A9E1-4155-BFF1-5EF2EE12E93E}" dt="2023-07-24T17:15:33.382" v="2382"/>
+          <ac:spMkLst>
+            <pc:docMk/>
+            <pc:sldMk cId="505743577" sldId="2145706229"/>
+            <ac:spMk id="4" creationId="{8261D168-84A4-F056-4C42-0ABC1EBF21E6}"/>
+          </ac:spMkLst>
+        </pc:spChg>
+        <pc:spChg chg="del mod">
+          <ac:chgData name="Graf Thomas, INI-NET-VNC-HCS" userId="487bc3e3-9ce7-4cdd-b7b4-8899ea88d289" providerId="ADAL" clId="{40188488-A9E1-4155-BFF1-5EF2EE12E93E}" dt="2023-07-24T17:15:32.900" v="2381" actId="478"/>
           <ac:spMkLst>
             <pc:docMk/>
             <pc:sldMk cId="505743577" sldId="2145706229"/>
@@ -1102,6 +1111,44 @@
           <pc:sldMk cId="4168080765" sldId="2145706237"/>
         </pc:sldMkLst>
       </pc:sldChg>
+      <pc:sldChg chg="add del">
+        <pc:chgData name="Graf Thomas, INI-NET-VNC-HCS" userId="487bc3e3-9ce7-4cdd-b7b4-8899ea88d289" providerId="ADAL" clId="{40188488-A9E1-4155-BFF1-5EF2EE12E93E}" dt="2023-07-24T17:16:36.535" v="2446" actId="47"/>
+        <pc:sldMkLst>
+          <pc:docMk/>
+          <pc:sldMk cId="3515510456" sldId="2145706239"/>
+        </pc:sldMkLst>
+      </pc:sldChg>
+      <pc:sldChg chg="modSp add mod">
+        <pc:chgData name="Graf Thomas, INI-NET-VNC-HCS" userId="487bc3e3-9ce7-4cdd-b7b4-8899ea88d289" providerId="ADAL" clId="{40188488-A9E1-4155-BFF1-5EF2EE12E93E}" dt="2023-07-24T17:16:26.766" v="2445" actId="20577"/>
+        <pc:sldMkLst>
+          <pc:docMk/>
+          <pc:sldMk cId="2425809725" sldId="2145706240"/>
+        </pc:sldMkLst>
+        <pc:spChg chg="mod">
+          <ac:chgData name="Graf Thomas, INI-NET-VNC-HCS" userId="487bc3e3-9ce7-4cdd-b7b4-8899ea88d289" providerId="ADAL" clId="{40188488-A9E1-4155-BFF1-5EF2EE12E93E}" dt="2023-07-24T17:16:26.766" v="2445" actId="20577"/>
+          <ac:spMkLst>
+            <pc:docMk/>
+            <pc:sldMk cId="2425809725" sldId="2145706240"/>
+            <ac:spMk id="2" creationId="{FF20F271-6F0D-4AC0-BB1D-F5C338165C13}"/>
+          </ac:spMkLst>
+        </pc:spChg>
+        <pc:spChg chg="mod">
+          <ac:chgData name="Graf Thomas, INI-NET-VNC-HCS" userId="487bc3e3-9ce7-4cdd-b7b4-8899ea88d289" providerId="ADAL" clId="{40188488-A9E1-4155-BFF1-5EF2EE12E93E}" dt="2023-07-24T17:15:53.645" v="2387" actId="20577"/>
+          <ac:spMkLst>
+            <pc:docMk/>
+            <pc:sldMk cId="2425809725" sldId="2145706240"/>
+            <ac:spMk id="3" creationId="{29C0DFD4-432D-4B0C-93DF-790441DCF5B9}"/>
+          </ac:spMkLst>
+        </pc:spChg>
+        <pc:spChg chg="mod">
+          <ac:chgData name="Graf Thomas, INI-NET-VNC-HCS" userId="487bc3e3-9ce7-4cdd-b7b4-8899ea88d289" providerId="ADAL" clId="{40188488-A9E1-4155-BFF1-5EF2EE12E93E}" dt="2023-07-24T17:15:26.574" v="2380" actId="14100"/>
+          <ac:spMkLst>
+            <pc:docMk/>
+            <pc:sldMk cId="2425809725" sldId="2145706240"/>
+            <ac:spMk id="6" creationId="{7C3B84B0-CEE6-9508-972D-6095E0E01E98}"/>
+          </ac:spMkLst>
+        </pc:spChg>
+      </pc:sldChg>
     </pc:docChg>
   </pc:docChgLst>
 </pc:chgInfo>
@@ -5802,14 +5849,7 @@
                 <a:latin typeface="+mj-lt"/>
                 <a:hlinkClick r:id="rId2"/>
               </a:rPr>
-              <a:t>zhuoyao.lin@huawei.com, </a:t>
-            </a:r>
-            <a:r>
-              <a:rPr lang="de-CH" sz="1200" dirty="0">
-                <a:latin typeface="+mj-lt"/>
-                <a:hlinkClick r:id="rId2"/>
-              </a:rPr>
-              <a:t>jean.quilbeuf@huawei.com</a:t>
+              <a:t>zhuoyao.lin@huawei.com, jean.quilbeuf@huawei.com</a:t>
             </a:r>
           </a:p>
           <a:p>
@@ -5956,6 +5996,731 @@
 </file>
 
 <file path=ppt/slides/slide10.xml><?xml version="1.0" encoding="utf-8"?>
+<p:sld xmlns:a="http://schemas.openxmlformats.org/drawingml/2006/main" xmlns:r="http://schemas.openxmlformats.org/officeDocument/2006/relationships" xmlns:p="http://schemas.openxmlformats.org/presentationml/2006/main">
+  <p:cSld>
+    <p:spTree>
+      <p:nvGrpSpPr>
+        <p:cNvPr id="1" name=""/>
+        <p:cNvGrpSpPr/>
+        <p:nvPr/>
+      </p:nvGrpSpPr>
+      <p:grpSpPr>
+        <a:xfrm>
+          <a:off x="0" y="0"/>
+          <a:ext cx="0" cy="0"/>
+          <a:chOff x="0" y="0"/>
+          <a:chExt cx="0" cy="0"/>
+        </a:xfrm>
+      </p:grpSpPr>
+      <p:sp>
+        <p:nvSpPr>
+          <p:cNvPr id="2" name="Title 1">
+            <a:extLst>
+              <a:ext uri="{FF2B5EF4-FFF2-40B4-BE49-F238E27FC236}">
+                <a16:creationId xmlns:a16="http://schemas.microsoft.com/office/drawing/2014/main" id="{FF20F271-6F0D-4AC0-BB1D-F5C338165C13}"/>
+              </a:ext>
+            </a:extLst>
+          </p:cNvPr>
+          <p:cNvSpPr>
+            <a:spLocks noGrp="1"/>
+          </p:cNvSpPr>
+          <p:nvPr>
+            <p:ph type="title"/>
+          </p:nvPr>
+        </p:nvSpPr>
+        <p:spPr/>
+        <p:txBody>
+          <a:bodyPr>
+            <a:normAutofit/>
+          </a:bodyPr>
+          <a:lstStyle/>
+          <a:p>
+            <a:r>
+              <a:rPr lang="en-US" sz="2800" b="1" dirty="0"/>
+              <a:t>Validating Semantics in YANG Push messages</a:t>
+            </a:r>
+            <a:br>
+              <a:rPr lang="en-GB" sz="3600" dirty="0"/>
+            </a:br>
+            <a:r>
+              <a:rPr lang="en-US" sz="2700" dirty="0">
+                <a:solidFill>
+                  <a:schemeClr val="bg2">
+                    <a:lumMod val="75000"/>
+                  </a:schemeClr>
+                </a:solidFill>
+              </a:rPr>
+              <a:t>Status and Next Steps</a:t>
+            </a:r>
+          </a:p>
+        </p:txBody>
+      </p:sp>
+      <p:sp>
+        <p:nvSpPr>
+          <p:cNvPr id="3" name="Content Placeholder 2">
+            <a:extLst>
+              <a:ext uri="{FF2B5EF4-FFF2-40B4-BE49-F238E27FC236}">
+                <a16:creationId xmlns:a16="http://schemas.microsoft.com/office/drawing/2014/main" id="{29C0DFD4-432D-4B0C-93DF-790441DCF5B9}"/>
+              </a:ext>
+            </a:extLst>
+          </p:cNvPr>
+          <p:cNvSpPr>
+            <a:spLocks noGrp="1"/>
+          </p:cNvSpPr>
+          <p:nvPr>
+            <p:ph idx="1"/>
+          </p:nvPr>
+        </p:nvSpPr>
+        <p:spPr>
+          <a:xfrm>
+            <a:off x="838199" y="1884420"/>
+            <a:ext cx="8208819" cy="4292543"/>
+          </a:xfrm>
+        </p:spPr>
+        <p:txBody>
+          <a:bodyPr>
+            <a:noAutofit/>
+          </a:bodyPr>
+          <a:lstStyle/>
+          <a:p>
+            <a:pPr marL="0" indent="0">
+              <a:buFont typeface="Arial" panose="020B0604020202020204" pitchFamily="34" charset="0"/>
+              <a:buNone/>
+            </a:pPr>
+            <a:r>
+              <a:rPr lang="en-US" sz="2000" b="1" dirty="0"/>
+              <a:t>Status</a:t>
+            </a:r>
+          </a:p>
+          <a:p>
+            <a:pPr marL="285750" marR="0" indent="-285750">
+              <a:lnSpc>
+                <a:spcPct val="107000"/>
+              </a:lnSpc>
+              <a:spcBef>
+                <a:spcPts val="0"/>
+              </a:spcBef>
+              <a:spcAft>
+                <a:spcPts val="800"/>
+              </a:spcAft>
+              <a:buFont typeface="Arial" panose="020B0604020202020204" pitchFamily="34" charset="0"/>
+              <a:buChar char="•"/>
+            </a:pPr>
+            <a:r>
+              <a:rPr lang="en-US" sz="1800" dirty="0">
+                <a:effectLst/>
+                <a:latin typeface="Calibri" panose="020F0502020204030204" pitchFamily="34" charset="0"/>
+                <a:ea typeface="Calibri" panose="020F0502020204030204" pitchFamily="34" charset="0"/>
+                <a:cs typeface="Times New Roman" panose="02020603050405020304" pitchFamily="18" charset="0"/>
+              </a:rPr>
+              <a:t>YANG modules defines the schema body of the notification message.</a:t>
+            </a:r>
+          </a:p>
+          <a:p>
+            <a:pPr marL="285750" marR="0" indent="-285750">
+              <a:lnSpc>
+                <a:spcPct val="107000"/>
+              </a:lnSpc>
+              <a:spcBef>
+                <a:spcPts val="0"/>
+              </a:spcBef>
+              <a:spcAft>
+                <a:spcPts val="800"/>
+              </a:spcAft>
+              <a:buFont typeface="Arial" panose="020B0604020202020204" pitchFamily="34" charset="0"/>
+              <a:buChar char="•"/>
+            </a:pPr>
+            <a:r>
+              <a:rPr lang="en-US" sz="1800" dirty="0">
+                <a:latin typeface="Calibri" panose="020F0502020204030204" pitchFamily="34" charset="0"/>
+                <a:ea typeface="Calibri" panose="020F0502020204030204" pitchFamily="34" charset="0"/>
+                <a:cs typeface="Times New Roman" panose="02020603050405020304" pitchFamily="18" charset="0"/>
+              </a:rPr>
+              <a:t>The body of the message is defined as XPath over the YANG module.</a:t>
+            </a:r>
+            <a:endParaRPr lang="en-US" sz="1800" dirty="0">
+              <a:effectLst/>
+              <a:latin typeface="Calibri" panose="020F0502020204030204" pitchFamily="34" charset="0"/>
+              <a:ea typeface="Calibri" panose="020F0502020204030204" pitchFamily="34" charset="0"/>
+              <a:cs typeface="Times New Roman" panose="02020603050405020304" pitchFamily="18" charset="0"/>
+            </a:endParaRPr>
+          </a:p>
+          <a:p>
+            <a:pPr marL="285750" marR="0" indent="-285750">
+              <a:lnSpc>
+                <a:spcPct val="107000"/>
+              </a:lnSpc>
+              <a:spcBef>
+                <a:spcPts val="0"/>
+              </a:spcBef>
+              <a:spcAft>
+                <a:spcPts val="800"/>
+              </a:spcAft>
+              <a:buFont typeface="Arial" panose="020B0604020202020204" pitchFamily="34" charset="0"/>
+              <a:buChar char="•"/>
+            </a:pPr>
+            <a:r>
+              <a:rPr lang="en-US" sz="1800" dirty="0"/>
+              <a:t>Various RFCs and drafts define the NETCONF envelop to send the message.</a:t>
+            </a:r>
+          </a:p>
+          <a:p>
+            <a:pPr marL="285750" marR="0" indent="-285750">
+              <a:lnSpc>
+                <a:spcPct val="107000"/>
+              </a:lnSpc>
+              <a:spcBef>
+                <a:spcPts val="0"/>
+              </a:spcBef>
+              <a:spcAft>
+                <a:spcPts val="800"/>
+              </a:spcAft>
+              <a:buFont typeface="Arial" panose="020B0604020202020204" pitchFamily="34" charset="0"/>
+              <a:buChar char="•"/>
+            </a:pPr>
+            <a:r>
+              <a:rPr lang="en-US" sz="1800" dirty="0"/>
+              <a:t>YANG Validators uses special flags to validate notifications: </a:t>
+            </a:r>
+          </a:p>
+          <a:p>
+            <a:pPr marL="742950" lvl="1" indent="-285750">
+              <a:lnSpc>
+                <a:spcPct val="107000"/>
+              </a:lnSpc>
+              <a:spcBef>
+                <a:spcPts val="0"/>
+              </a:spcBef>
+              <a:spcAft>
+                <a:spcPts val="800"/>
+              </a:spcAft>
+            </a:pPr>
+            <a:r>
+              <a:rPr lang="en-US" sz="1400" b="0" i="0" u="none" strike="noStrike" dirty="0" err="1">
+                <a:solidFill>
+                  <a:srgbClr val="000000"/>
+                </a:solidFill>
+                <a:effectLst/>
+                <a:latin typeface="Courier New" panose="02070309020205020404" pitchFamily="49" charset="0"/>
+              </a:rPr>
+              <a:t>yanglint</a:t>
+            </a:r>
+            <a:r>
+              <a:rPr lang="en-US" sz="1400" dirty="0">
+                <a:solidFill>
+                  <a:srgbClr val="000000"/>
+                </a:solidFill>
+                <a:latin typeface="Courier New" panose="02070309020205020404" pitchFamily="49" charset="0"/>
+              </a:rPr>
+              <a:t> </a:t>
+            </a:r>
+            <a:r>
+              <a:rPr lang="en-US" sz="1400" b="0" i="0" u="none" strike="noStrike" dirty="0">
+                <a:solidFill>
+                  <a:srgbClr val="000000"/>
+                </a:solidFill>
+                <a:effectLst/>
+                <a:latin typeface="Courier New" panose="02070309020205020404" pitchFamily="49" charset="0"/>
+              </a:rPr>
+              <a:t>-strict --</a:t>
+            </a:r>
+            <a:r>
+              <a:rPr lang="en-US" sz="1400" b="0" i="0" u="none" strike="noStrike" dirty="0">
+                <a:solidFill>
+                  <a:srgbClr val="007ACC"/>
+                </a:solidFill>
+                <a:effectLst/>
+                <a:latin typeface="Courier New" panose="02070309020205020404" pitchFamily="49" charset="0"/>
+              </a:rPr>
+              <a:t>type</a:t>
+            </a:r>
+            <a:r>
+              <a:rPr lang="en-US" sz="1400" b="0" i="0" u="none" strike="noStrike" dirty="0">
+                <a:solidFill>
+                  <a:srgbClr val="000000"/>
+                </a:solidFill>
+                <a:effectLst/>
+                <a:latin typeface="Courier New" panose="02070309020205020404" pitchFamily="49" charset="0"/>
+              </a:rPr>
+              <a:t> </a:t>
+            </a:r>
+            <a:r>
+              <a:rPr lang="en-US" sz="1400" b="0" i="0" u="none" strike="noStrike" dirty="0" err="1">
+                <a:solidFill>
+                  <a:srgbClr val="000000"/>
+                </a:solidFill>
+                <a:effectLst/>
+                <a:latin typeface="Courier New" panose="02070309020205020404" pitchFamily="49" charset="0"/>
+              </a:rPr>
+              <a:t>nc-notif</a:t>
+            </a:r>
+            <a:r>
+              <a:rPr lang="en-US" sz="1400" b="0" i="0" u="none" strike="noStrike" dirty="0">
+                <a:solidFill>
+                  <a:srgbClr val="000000"/>
+                </a:solidFill>
+                <a:effectLst/>
+                <a:latin typeface="Courier New" panose="02070309020205020404" pitchFamily="49" charset="0"/>
+              </a:rPr>
+              <a:t> -f xml </a:t>
+            </a:r>
+            <a:r>
+              <a:rPr lang="en-US" sz="1400" b="0" i="0" u="none" strike="noStrike" dirty="0" err="1">
+                <a:solidFill>
+                  <a:srgbClr val="000000"/>
+                </a:solidFill>
+                <a:effectLst/>
+                <a:latin typeface="Courier New" panose="02070309020205020404" pitchFamily="49" charset="0"/>
+              </a:rPr>
+              <a:t>notification.yang</a:t>
+            </a:r>
+            <a:r>
+              <a:rPr lang="en-US" sz="1400" b="0" i="0" u="none" strike="noStrike" dirty="0">
+                <a:solidFill>
+                  <a:srgbClr val="000000"/>
+                </a:solidFill>
+                <a:effectLst/>
+                <a:latin typeface="Courier New" panose="02070309020205020404" pitchFamily="49" charset="0"/>
+              </a:rPr>
+              <a:t> test.xml</a:t>
+            </a:r>
+            <a:endParaRPr lang="en-US" sz="1400" dirty="0"/>
+          </a:p>
+          <a:p>
+            <a:pPr marL="285750" marR="0" indent="-285750">
+              <a:lnSpc>
+                <a:spcPct val="107000"/>
+              </a:lnSpc>
+              <a:spcBef>
+                <a:spcPts val="0"/>
+              </a:spcBef>
+              <a:spcAft>
+                <a:spcPts val="800"/>
+              </a:spcAft>
+              <a:buFont typeface="Arial" panose="020B0604020202020204" pitchFamily="34" charset="0"/>
+              <a:buChar char="•"/>
+            </a:pPr>
+            <a:r>
+              <a:rPr lang="en-US" sz="1800" dirty="0"/>
+              <a:t>Kafka </a:t>
+            </a:r>
+            <a:r>
+              <a:rPr lang="en-US" sz="1800" dirty="0" err="1"/>
+              <a:t>serdes</a:t>
+            </a:r>
+            <a:r>
+              <a:rPr lang="en-US" sz="1800" dirty="0"/>
+              <a:t> expects one schema to describe a message.</a:t>
+            </a:r>
+          </a:p>
+          <a:p>
+            <a:pPr marL="0" indent="0">
+              <a:buFont typeface="Arial" panose="020B0604020202020204" pitchFamily="34" charset="0"/>
+              <a:buNone/>
+            </a:pPr>
+            <a:r>
+              <a:rPr lang="en-US" sz="2000" b="1" dirty="0"/>
+              <a:t>Next Step</a:t>
+            </a:r>
+          </a:p>
+          <a:p>
+            <a:r>
+              <a:rPr lang="en-US" sz="1800" dirty="0"/>
+              <a:t>Check if the existing validators can validate seamlessly NETCONF and YANG push envelope extensions.</a:t>
+            </a:r>
+          </a:p>
+          <a:p>
+            <a:r>
+              <a:rPr lang="en-US" sz="1800" dirty="0"/>
+              <a:t>Develop algorithm to generate a single YANG module that describe a </a:t>
+            </a:r>
+            <a:br>
+              <a:rPr lang="en-US" sz="1800" dirty="0"/>
+            </a:br>
+            <a:r>
+              <a:rPr lang="en-US" sz="1800" dirty="0"/>
+              <a:t>full message including the NETCONF and YANG push headers.</a:t>
+            </a:r>
+          </a:p>
+        </p:txBody>
+      </p:sp>
+      <p:sp>
+        <p:nvSpPr>
+          <p:cNvPr id="16" name="Slide Number Placeholder 1">
+            <a:extLst>
+              <a:ext uri="{FF2B5EF4-FFF2-40B4-BE49-F238E27FC236}">
+                <a16:creationId xmlns:a16="http://schemas.microsoft.com/office/drawing/2014/main" id="{4D0044F8-1C12-4A59-883A-7B56B9370029}"/>
+              </a:ext>
+            </a:extLst>
+          </p:cNvPr>
+          <p:cNvSpPr>
+            <a:spLocks noGrp="1"/>
+          </p:cNvSpPr>
+          <p:nvPr>
+            <p:ph type="sldNum" sz="quarter" idx="12"/>
+          </p:nvPr>
+        </p:nvSpPr>
+        <p:spPr>
+          <a:xfrm>
+            <a:off x="11607800" y="6362700"/>
+            <a:ext cx="414338" cy="365125"/>
+          </a:xfrm>
+        </p:spPr>
+        <p:txBody>
+          <a:bodyPr/>
+          <a:lstStyle/>
+          <a:p>
+            <a:fld id="{FC4AC485-25DE-431E-B345-9C0A15BB7F8A}" type="slidenum">
+              <a:rPr lang="en-US" sz="2200" smtClean="0"/>
+              <a:t>10</a:t>
+            </a:fld>
+            <a:endParaRPr lang="en-US" sz="2200"/>
+          </a:p>
+        </p:txBody>
+      </p:sp>
+      <p:pic>
+        <p:nvPicPr>
+          <p:cNvPr id="5" name="Picture 4">
+            <a:extLst>
+              <a:ext uri="{FF2B5EF4-FFF2-40B4-BE49-F238E27FC236}">
+                <a16:creationId xmlns:a16="http://schemas.microsoft.com/office/drawing/2014/main" id="{0A90BC99-792A-481A-9F32-B4255E7EE4CA}"/>
+              </a:ext>
+            </a:extLst>
+          </p:cNvPr>
+          <p:cNvPicPr>
+            <a:picLocks noChangeAspect="1"/>
+          </p:cNvPicPr>
+          <p:nvPr/>
+        </p:nvPicPr>
+        <p:blipFill>
+          <a:blip r:embed="rId2"/>
+          <a:stretch>
+            <a:fillRect/>
+          </a:stretch>
+        </p:blipFill>
+        <p:spPr>
+          <a:xfrm>
+            <a:off x="8955462" y="812290"/>
+            <a:ext cx="3048962" cy="4314869"/>
+          </a:xfrm>
+          <a:prstGeom prst="rect">
+            <a:avLst/>
+          </a:prstGeom>
+        </p:spPr>
+      </p:pic>
+      <p:sp>
+        <p:nvSpPr>
+          <p:cNvPr id="6" name="Subtitle 4">
+            <a:extLst>
+              <a:ext uri="{FF2B5EF4-FFF2-40B4-BE49-F238E27FC236}">
+                <a16:creationId xmlns:a16="http://schemas.microsoft.com/office/drawing/2014/main" id="{7C3B84B0-CEE6-9508-972D-6095E0E01E98}"/>
+              </a:ext>
+            </a:extLst>
+          </p:cNvPr>
+          <p:cNvSpPr txBox="1">
+            <a:spLocks/>
+          </p:cNvSpPr>
+          <p:nvPr/>
+        </p:nvSpPr>
+        <p:spPr>
+          <a:xfrm>
+            <a:off x="838200" y="5574325"/>
+            <a:ext cx="11163943" cy="787312"/>
+          </a:xfrm>
+          <a:prstGeom prst="rect">
+            <a:avLst/>
+          </a:prstGeom>
+        </p:spPr>
+        <p:txBody>
+          <a:bodyPr vert="horz" lIns="91440" tIns="45720" rIns="91440" bIns="45720" rtlCol="0">
+            <a:normAutofit fontScale="25000" lnSpcReduction="20000"/>
+          </a:bodyPr>
+          <a:lstStyle>
+            <a:lvl1pPr marL="228600" indent="-228600" algn="l" defTabSz="914400" rtl="0" eaLnBrk="1" latinLnBrk="0" hangingPunct="1">
+              <a:lnSpc>
+                <a:spcPct val="90000"/>
+              </a:lnSpc>
+              <a:spcBef>
+                <a:spcPts val="1000"/>
+              </a:spcBef>
+              <a:buFont typeface="Arial" panose="020B0604020202020204" pitchFamily="34" charset="0"/>
+              <a:buChar char="•"/>
+              <a:defRPr sz="2800" kern="1200">
+                <a:solidFill>
+                  <a:schemeClr val="tx1"/>
+                </a:solidFill>
+                <a:latin typeface="+mn-lt"/>
+                <a:ea typeface="+mn-ea"/>
+                <a:cs typeface="+mn-cs"/>
+              </a:defRPr>
+            </a:lvl1pPr>
+            <a:lvl2pPr marL="685800" indent="-228600" algn="l" defTabSz="914400" rtl="0" eaLnBrk="1" latinLnBrk="0" hangingPunct="1">
+              <a:lnSpc>
+                <a:spcPct val="90000"/>
+              </a:lnSpc>
+              <a:spcBef>
+                <a:spcPts val="500"/>
+              </a:spcBef>
+              <a:buFont typeface="Arial" panose="020B0604020202020204" pitchFamily="34" charset="0"/>
+              <a:buChar char="•"/>
+              <a:defRPr sz="2400" kern="1200">
+                <a:solidFill>
+                  <a:schemeClr val="tx1"/>
+                </a:solidFill>
+                <a:latin typeface="+mn-lt"/>
+                <a:ea typeface="+mn-ea"/>
+                <a:cs typeface="+mn-cs"/>
+              </a:defRPr>
+            </a:lvl2pPr>
+            <a:lvl3pPr marL="1143000" indent="-228600" algn="l" defTabSz="914400" rtl="0" eaLnBrk="1" latinLnBrk="0" hangingPunct="1">
+              <a:lnSpc>
+                <a:spcPct val="90000"/>
+              </a:lnSpc>
+              <a:spcBef>
+                <a:spcPts val="500"/>
+              </a:spcBef>
+              <a:buFont typeface="Arial" panose="020B0604020202020204" pitchFamily="34" charset="0"/>
+              <a:buChar char="•"/>
+              <a:defRPr sz="2000" kern="1200">
+                <a:solidFill>
+                  <a:schemeClr val="tx1"/>
+                </a:solidFill>
+                <a:latin typeface="+mn-lt"/>
+                <a:ea typeface="+mn-ea"/>
+                <a:cs typeface="+mn-cs"/>
+              </a:defRPr>
+            </a:lvl3pPr>
+            <a:lvl4pPr marL="1600200" indent="-228600" algn="l" defTabSz="914400" rtl="0" eaLnBrk="1" latinLnBrk="0" hangingPunct="1">
+              <a:lnSpc>
+                <a:spcPct val="90000"/>
+              </a:lnSpc>
+              <a:spcBef>
+                <a:spcPts val="500"/>
+              </a:spcBef>
+              <a:buFont typeface="Arial" panose="020B0604020202020204" pitchFamily="34" charset="0"/>
+              <a:buChar char="•"/>
+              <a:defRPr sz="1800" kern="1200">
+                <a:solidFill>
+                  <a:schemeClr val="tx1"/>
+                </a:solidFill>
+                <a:latin typeface="+mn-lt"/>
+                <a:ea typeface="+mn-ea"/>
+                <a:cs typeface="+mn-cs"/>
+              </a:defRPr>
+            </a:lvl4pPr>
+            <a:lvl5pPr marL="2057400" indent="-228600" algn="l" defTabSz="914400" rtl="0" eaLnBrk="1" latinLnBrk="0" hangingPunct="1">
+              <a:lnSpc>
+                <a:spcPct val="90000"/>
+              </a:lnSpc>
+              <a:spcBef>
+                <a:spcPts val="500"/>
+              </a:spcBef>
+              <a:buFont typeface="Arial" panose="020B0604020202020204" pitchFamily="34" charset="0"/>
+              <a:buChar char="•"/>
+              <a:defRPr sz="1800" kern="1200">
+                <a:solidFill>
+                  <a:schemeClr val="tx1"/>
+                </a:solidFill>
+                <a:latin typeface="+mn-lt"/>
+                <a:ea typeface="+mn-ea"/>
+                <a:cs typeface="+mn-cs"/>
+              </a:defRPr>
+            </a:lvl5pPr>
+            <a:lvl6pPr marL="2514600" indent="-228600" algn="l" defTabSz="914400" rtl="0" eaLnBrk="1" latinLnBrk="0" hangingPunct="1">
+              <a:lnSpc>
+                <a:spcPct val="90000"/>
+              </a:lnSpc>
+              <a:spcBef>
+                <a:spcPts val="500"/>
+              </a:spcBef>
+              <a:buFont typeface="Arial" panose="020B0604020202020204" pitchFamily="34" charset="0"/>
+              <a:buChar char="•"/>
+              <a:defRPr sz="1800" kern="1200">
+                <a:solidFill>
+                  <a:schemeClr val="tx1"/>
+                </a:solidFill>
+                <a:latin typeface="+mn-lt"/>
+                <a:ea typeface="+mn-ea"/>
+                <a:cs typeface="+mn-cs"/>
+              </a:defRPr>
+            </a:lvl6pPr>
+            <a:lvl7pPr marL="2971800" indent="-228600" algn="l" defTabSz="914400" rtl="0" eaLnBrk="1" latinLnBrk="0" hangingPunct="1">
+              <a:lnSpc>
+                <a:spcPct val="90000"/>
+              </a:lnSpc>
+              <a:spcBef>
+                <a:spcPts val="500"/>
+              </a:spcBef>
+              <a:buFont typeface="Arial" panose="020B0604020202020204" pitchFamily="34" charset="0"/>
+              <a:buChar char="•"/>
+              <a:defRPr sz="1800" kern="1200">
+                <a:solidFill>
+                  <a:schemeClr val="tx1"/>
+                </a:solidFill>
+                <a:latin typeface="+mn-lt"/>
+                <a:ea typeface="+mn-ea"/>
+                <a:cs typeface="+mn-cs"/>
+              </a:defRPr>
+            </a:lvl7pPr>
+            <a:lvl8pPr marL="3429000" indent="-228600" algn="l" defTabSz="914400" rtl="0" eaLnBrk="1" latinLnBrk="0" hangingPunct="1">
+              <a:lnSpc>
+                <a:spcPct val="90000"/>
+              </a:lnSpc>
+              <a:spcBef>
+                <a:spcPts val="500"/>
+              </a:spcBef>
+              <a:buFont typeface="Arial" panose="020B0604020202020204" pitchFamily="34" charset="0"/>
+              <a:buChar char="•"/>
+              <a:defRPr sz="1800" kern="1200">
+                <a:solidFill>
+                  <a:schemeClr val="tx1"/>
+                </a:solidFill>
+                <a:latin typeface="+mn-lt"/>
+                <a:ea typeface="+mn-ea"/>
+                <a:cs typeface="+mn-cs"/>
+              </a:defRPr>
+            </a:lvl8pPr>
+            <a:lvl9pPr marL="3886200" indent="-228600" algn="l" defTabSz="914400" rtl="0" eaLnBrk="1" latinLnBrk="0" hangingPunct="1">
+              <a:lnSpc>
+                <a:spcPct val="90000"/>
+              </a:lnSpc>
+              <a:spcBef>
+                <a:spcPts val="500"/>
+              </a:spcBef>
+              <a:buFont typeface="Arial" panose="020B0604020202020204" pitchFamily="34" charset="0"/>
+              <a:buChar char="•"/>
+              <a:defRPr sz="1800" kern="1200">
+                <a:solidFill>
+                  <a:schemeClr val="tx1"/>
+                </a:solidFill>
+                <a:latin typeface="+mn-lt"/>
+                <a:ea typeface="+mn-ea"/>
+                <a:cs typeface="+mn-cs"/>
+              </a:defRPr>
+            </a:lvl9pPr>
+          </a:lstStyle>
+          <a:p>
+            <a:pPr marL="0" indent="0" algn="r">
+              <a:spcBef>
+                <a:spcPts val="300"/>
+              </a:spcBef>
+              <a:buNone/>
+            </a:pPr>
+            <a:r>
+              <a:rPr lang="de-CH" sz="4000" dirty="0">
+                <a:latin typeface="+mj-lt"/>
+                <a:hlinkClick r:id="rId3"/>
+              </a:rPr>
+              <a:t>zhuoyao.lin@huawei.com, jean.quilbeuf@huawei.com</a:t>
+            </a:r>
+          </a:p>
+          <a:p>
+            <a:pPr marL="0" indent="0" algn="r">
+              <a:spcBef>
+                <a:spcPts val="300"/>
+              </a:spcBef>
+              <a:buNone/>
+            </a:pPr>
+            <a:r>
+              <a:rPr lang="de-CH" sz="4000" dirty="0">
+                <a:latin typeface="+mj-lt"/>
+                <a:hlinkClick r:id="rId3"/>
+              </a:rPr>
+              <a:t>ahmed.elhassany@swisscom.com, </a:t>
+            </a:r>
+            <a:r>
+              <a:rPr lang="de-CH" sz="4000" dirty="0">
+                <a:latin typeface="+mj-lt"/>
+                <a:hlinkClick r:id="rId4"/>
+              </a:rPr>
+              <a:t>alex.huang-feng@insa-lyon.fr</a:t>
+            </a:r>
+            <a:endParaRPr lang="de-CH" sz="4000" dirty="0">
+              <a:latin typeface="+mj-lt"/>
+            </a:endParaRPr>
+          </a:p>
+          <a:p>
+            <a:pPr marL="0" indent="0" algn="r">
+              <a:spcBef>
+                <a:spcPts val="300"/>
+              </a:spcBef>
+              <a:buNone/>
+            </a:pPr>
+            <a:r>
+              <a:rPr lang="de-CH" sz="4000" dirty="0">
+                <a:latin typeface="+mj-lt"/>
+                <a:hlinkClick r:id="rId3"/>
+              </a:rPr>
+              <a:t>benoit.claise@huawei.com, thomas.graf@swisscom.com</a:t>
+            </a:r>
+            <a:endParaRPr lang="de-CH" sz="4000" dirty="0">
+              <a:latin typeface="+mj-lt"/>
+            </a:endParaRPr>
+          </a:p>
+          <a:p>
+            <a:pPr marL="0" indent="0" algn="r">
+              <a:spcBef>
+                <a:spcPts val="300"/>
+              </a:spcBef>
+              <a:buNone/>
+            </a:pPr>
+            <a:endParaRPr lang="de-CH" sz="3800" dirty="0">
+              <a:latin typeface="+mj-lt"/>
+            </a:endParaRPr>
+          </a:p>
+          <a:p>
+            <a:pPr marL="0" indent="0" algn="r">
+              <a:spcBef>
+                <a:spcPts val="300"/>
+              </a:spcBef>
+              <a:buNone/>
+            </a:pPr>
+            <a:r>
+              <a:rPr lang="de-CH" sz="3800" dirty="0">
+                <a:latin typeface="+mj-lt"/>
+              </a:rPr>
+              <a:t>24. </a:t>
+            </a:r>
+            <a:r>
+              <a:rPr lang="de-CH" sz="3800" dirty="0" err="1">
+                <a:latin typeface="+mj-lt"/>
+                <a:ea typeface="+mj-ea"/>
+                <a:cs typeface="+mj-cs"/>
+              </a:rPr>
+              <a:t>July</a:t>
+            </a:r>
+            <a:r>
+              <a:rPr lang="de-CH" sz="3800" dirty="0">
+                <a:latin typeface="+mj-lt"/>
+                <a:ea typeface="+mj-ea"/>
+                <a:cs typeface="+mj-cs"/>
+              </a:rPr>
+              <a:t> 2023</a:t>
+            </a:r>
+            <a:endParaRPr lang="de-CH" sz="3800" dirty="0">
+              <a:latin typeface="+mj-lt"/>
+            </a:endParaRPr>
+          </a:p>
+          <a:p>
+            <a:pPr algn="r"/>
+            <a:endParaRPr lang="de-CH" sz="2200" dirty="0"/>
+          </a:p>
+        </p:txBody>
+      </p:sp>
+    </p:spTree>
+    <p:extLst>
+      <p:ext uri="{BB962C8B-B14F-4D97-AF65-F5344CB8AC3E}">
+        <p14:creationId xmlns:p14="http://schemas.microsoft.com/office/powerpoint/2010/main" val="2425809725"/>
+      </p:ext>
+    </p:extLst>
+  </p:cSld>
+  <p:clrMapOvr>
+    <a:masterClrMapping/>
+  </p:clrMapOvr>
+</p:sld>
+</file>
+
+<file path=ppt/slides/slide11.xml><?xml version="1.0" encoding="utf-8"?>
 <p:sld xmlns:a="http://schemas.openxmlformats.org/drawingml/2006/main" xmlns:r="http://schemas.openxmlformats.org/officeDocument/2006/relationships" xmlns:p="http://schemas.openxmlformats.org/presentationml/2006/main">
   <p:cSld>
     <p:spTree>
@@ -6030,7 +6795,7 @@
 </p:sld>
 </file>
 
-<file path=ppt/slides/slide11.xml><?xml version="1.0" encoding="utf-8"?>
+<file path=ppt/slides/slide12.xml><?xml version="1.0" encoding="utf-8"?>
 <p:sld xmlns:a="http://schemas.openxmlformats.org/drawingml/2006/main" xmlns:r="http://schemas.openxmlformats.org/officeDocument/2006/relationships" xmlns:p="http://schemas.openxmlformats.org/presentationml/2006/main">
   <p:cSld>
     <p:spTree>
@@ -6229,7 +6994,7 @@
           <a:p>
             <a:fld id="{FC4AC485-25DE-431E-B345-9C0A15BB7F8A}" type="slidenum">
               <a:rPr lang="en-US" sz="2200" smtClean="0"/>
-              <a:t>11</a:t>
+              <a:t>12</a:t>
             </a:fld>
             <a:endParaRPr lang="en-US" sz="2200"/>
           </a:p>
@@ -6561,7 +7326,7 @@
 </p:sld>
 </file>
 
-<file path=ppt/slides/slide12.xml><?xml version="1.0" encoding="utf-8"?>
+<file path=ppt/slides/slide13.xml><?xml version="1.0" encoding="utf-8"?>
 <p:sld xmlns:a="http://schemas.openxmlformats.org/drawingml/2006/main" xmlns:r="http://schemas.openxmlformats.org/officeDocument/2006/relationships" xmlns:p="http://schemas.openxmlformats.org/presentationml/2006/main">
   <p:cSld>
     <p:spTree>
@@ -8917,7 +9682,7 @@
           <a:p>
             <a:fld id="{FC4AC485-25DE-431E-B345-9C0A15BB7F8A}" type="slidenum">
               <a:rPr lang="de-CH" sz="1400" smtClean="0"/>
-              <a:t>12</a:t>
+              <a:t>13</a:t>
             </a:fld>
             <a:endParaRPr lang="de-CH" sz="1400" dirty="0"/>
           </a:p>
@@ -8936,7 +9701,7 @@
 </p:sld>
 </file>
 
-<file path=ppt/slides/slide13.xml><?xml version="1.0" encoding="utf-8"?>
+<file path=ppt/slides/slide14.xml><?xml version="1.0" encoding="utf-8"?>
 <p:sld xmlns:a="http://schemas.openxmlformats.org/drawingml/2006/main" xmlns:r="http://schemas.openxmlformats.org/officeDocument/2006/relationships" xmlns:p="http://schemas.openxmlformats.org/presentationml/2006/main">
   <p:cSld>
     <p:spTree>
@@ -9004,7 +9769,7 @@
 </p:sld>
 </file>
 
-<file path=ppt/slides/slide14.xml><?xml version="1.0" encoding="utf-8"?>
+<file path=ppt/slides/slide15.xml><?xml version="1.0" encoding="utf-8"?>
 <p:sld xmlns:a="http://schemas.openxmlformats.org/drawingml/2006/main" xmlns:r="http://schemas.openxmlformats.org/officeDocument/2006/relationships" xmlns:p="http://schemas.openxmlformats.org/presentationml/2006/main">
   <p:cSld>
     <p:bg>
@@ -13848,7 +14613,7 @@
                   <a:spcPts val="600"/>
                 </a:spcAft>
               </a:pPr>
-              <a:t>14</a:t>
+              <a:t>15</a:t>
             </a:fld>
             <a:endParaRPr lang="en-US">
               <a:solidFill>
@@ -14201,7 +14966,7 @@
 </p:sld>
 </file>
 
-<file path=ppt/slides/slide15.xml><?xml version="1.0" encoding="utf-8"?>
+<file path=ppt/slides/slide16.xml><?xml version="1.0" encoding="utf-8"?>
 <p:sld xmlns:a="http://schemas.openxmlformats.org/drawingml/2006/main" xmlns:r="http://schemas.openxmlformats.org/officeDocument/2006/relationships" xmlns:p="http://schemas.openxmlformats.org/presentationml/2006/main">
   <p:cSld>
     <p:spTree>
@@ -14965,7 +15730,7 @@
           <a:p>
             <a:fld id="{FC4AC485-25DE-431E-B345-9C0A15BB7F8A}" type="slidenum">
               <a:rPr lang="de-CH" sz="1400" smtClean="0"/>
-              <a:t>15</a:t>
+              <a:t>16</a:t>
             </a:fld>
             <a:endParaRPr lang="de-CH" sz="1400" dirty="0"/>
           </a:p>
@@ -14984,7 +15749,7 @@
 </p:sld>
 </file>
 
-<file path=ppt/slides/slide16.xml><?xml version="1.0" encoding="utf-8"?>
+<file path=ppt/slides/slide17.xml><?xml version="1.0" encoding="utf-8"?>
 <p:sld xmlns:a="http://schemas.openxmlformats.org/drawingml/2006/main" xmlns:r="http://schemas.openxmlformats.org/officeDocument/2006/relationships" xmlns:p="http://schemas.openxmlformats.org/presentationml/2006/main">
   <p:cSld>
     <p:spTree>
@@ -15248,7 +16013,7 @@
           <a:p>
             <a:fld id="{FC4AC485-25DE-431E-B345-9C0A15BB7F8A}" type="slidenum">
               <a:rPr lang="de-CH" sz="1400" smtClean="0"/>
-              <a:t>16</a:t>
+              <a:t>17</a:t>
             </a:fld>
             <a:endParaRPr lang="de-CH" sz="1400" dirty="0"/>
           </a:p>
@@ -15267,7 +16032,7 @@
 </p:sld>
 </file>
 
-<file path=ppt/slides/slide17.xml><?xml version="1.0" encoding="utf-8"?>
+<file path=ppt/slides/slide18.xml><?xml version="1.0" encoding="utf-8"?>
 <p:sld xmlns:a="http://schemas.openxmlformats.org/drawingml/2006/main" xmlns:r="http://schemas.openxmlformats.org/officeDocument/2006/relationships" xmlns:p="http://schemas.openxmlformats.org/presentationml/2006/main">
   <p:cSld>
     <p:spTree>
@@ -15567,7 +16332,7 @@
           <a:p>
             <a:fld id="{FC4AC485-25DE-431E-B345-9C0A15BB7F8A}" type="slidenum">
               <a:rPr lang="de-CH" sz="1400" smtClean="0"/>
-              <a:t>17</a:t>
+              <a:t>18</a:t>
             </a:fld>
             <a:endParaRPr lang="de-CH" sz="1400" dirty="0"/>
           </a:p>
@@ -15586,7 +16351,7 @@
 </p:sld>
 </file>
 
-<file path=ppt/slides/slide18.xml><?xml version="1.0" encoding="utf-8"?>
+<file path=ppt/slides/slide19.xml><?xml version="1.0" encoding="utf-8"?>
 <p:sld xmlns:a="http://schemas.openxmlformats.org/drawingml/2006/main" xmlns:r="http://schemas.openxmlformats.org/officeDocument/2006/relationships" xmlns:p="http://schemas.openxmlformats.org/presentationml/2006/main">
   <p:cSld>
     <p:spTree>
@@ -17003,7 +17768,7 @@
           <a:p>
             <a:fld id="{FC4AC485-25DE-431E-B345-9C0A15BB7F8A}" type="slidenum">
               <a:rPr lang="de-CH" sz="1400" smtClean="0"/>
-              <a:t>18</a:t>
+              <a:t>19</a:t>
             </a:fld>
             <a:endParaRPr lang="de-CH" sz="1400" dirty="0"/>
           </a:p>
@@ -17013,311 +17778,6 @@
     <p:extLst>
       <p:ext uri="{BB962C8B-B14F-4D97-AF65-F5344CB8AC3E}">
         <p14:creationId xmlns:p14="http://schemas.microsoft.com/office/powerpoint/2010/main" val="1845302357"/>
-      </p:ext>
-    </p:extLst>
-  </p:cSld>
-  <p:clrMapOvr>
-    <a:masterClrMapping/>
-  </p:clrMapOvr>
-</p:sld>
-</file>
-
-<file path=ppt/slides/slide19.xml><?xml version="1.0" encoding="utf-8"?>
-<p:sld xmlns:a="http://schemas.openxmlformats.org/drawingml/2006/main" xmlns:r="http://schemas.openxmlformats.org/officeDocument/2006/relationships" xmlns:p="http://schemas.openxmlformats.org/presentationml/2006/main">
-  <p:cSld>
-    <p:spTree>
-      <p:nvGrpSpPr>
-        <p:cNvPr id="1" name=""/>
-        <p:cNvGrpSpPr/>
-        <p:nvPr/>
-      </p:nvGrpSpPr>
-      <p:grpSpPr>
-        <a:xfrm>
-          <a:off x="0" y="0"/>
-          <a:ext cx="0" cy="0"/>
-          <a:chOff x="0" y="0"/>
-          <a:chExt cx="0" cy="0"/>
-        </a:xfrm>
-      </p:grpSpPr>
-      <p:sp>
-        <p:nvSpPr>
-          <p:cNvPr id="4" name="Content Placeholder 1">
-            <a:extLst>
-              <a:ext uri="{FF2B5EF4-FFF2-40B4-BE49-F238E27FC236}">
-                <a16:creationId xmlns:a16="http://schemas.microsoft.com/office/drawing/2014/main" id="{D81DEC37-A600-4F6C-AE22-C81D97BEC259}"/>
-              </a:ext>
-            </a:extLst>
-          </p:cNvPr>
-          <p:cNvSpPr>
-            <a:spLocks noGrp="1"/>
-          </p:cNvSpPr>
-          <p:nvPr>
-            <p:ph idx="1"/>
-          </p:nvPr>
-        </p:nvSpPr>
-        <p:spPr>
-          <a:xfrm>
-            <a:off x="838200" y="2036618"/>
-            <a:ext cx="6518097" cy="4137532"/>
-          </a:xfrm>
-        </p:spPr>
-        <p:txBody>
-          <a:bodyPr/>
-          <a:lstStyle/>
-          <a:p>
-            <a:pPr marL="342900" indent="-342900">
-              <a:spcBef>
-                <a:spcPts val="2400"/>
-              </a:spcBef>
-              <a:buClr>
-                <a:schemeClr val="accent2"/>
-              </a:buClr>
-              <a:buFont typeface="+mj-lt"/>
-              <a:buAutoNum type="arabicPeriod"/>
-            </a:pPr>
-            <a:r>
-              <a:rPr lang="en-US" sz="1800" b="1" dirty="0"/>
-              <a:t>A single link </a:t>
-            </a:r>
-            <a:r>
-              <a:rPr lang="en-US" sz="1800" b="1"/>
-              <a:t>down </a:t>
-            </a:r>
-            <a:r>
-              <a:rPr lang="en-US" sz="1800"/>
-              <a:t>results </a:t>
-            </a:r>
-            <a:r>
-              <a:rPr lang="en-US" sz="1800" dirty="0"/>
-              <a:t>in multiple device topology, control-plane and forwarding-plane events being exposed at different times.</a:t>
-            </a:r>
-          </a:p>
-          <a:p>
-            <a:pPr marL="342900" indent="-342900">
-              <a:spcBef>
-                <a:spcPts val="1800"/>
-              </a:spcBef>
-              <a:buClr>
-                <a:schemeClr val="accent2"/>
-              </a:buClr>
-              <a:buFont typeface="+mj-lt"/>
-              <a:buAutoNum type="arabicPeriod"/>
-            </a:pPr>
-            <a:r>
-              <a:rPr lang="en-US" sz="1800" b="1" dirty="0"/>
-              <a:t>Determine </a:t>
-            </a:r>
-            <a:r>
-              <a:rPr lang="en-US" sz="1800" dirty="0"/>
-              <a:t>which interfaces and BGP </a:t>
-            </a:r>
-            <a:r>
-              <a:rPr lang="en-US" sz="1800" dirty="0" err="1"/>
-              <a:t>peerings</a:t>
-            </a:r>
-            <a:r>
-              <a:rPr lang="en-US" sz="1800" dirty="0"/>
-              <a:t> are being used first and then observe state. </a:t>
-            </a:r>
-            <a:r>
-              <a:rPr lang="en-US" sz="1800" b="1" dirty="0"/>
-              <a:t>Observe </a:t>
-            </a:r>
-            <a:r>
-              <a:rPr lang="en-US" sz="1800" dirty="0"/>
-              <a:t>BGP withdrawals and updates, traffic drop spikes and missing traffic. Generate multiple concerns.</a:t>
-            </a:r>
-          </a:p>
-          <a:p>
-            <a:pPr marL="342900" indent="-342900">
-              <a:spcBef>
-                <a:spcPts val="1800"/>
-              </a:spcBef>
-              <a:buClr>
-                <a:schemeClr val="accent2"/>
-              </a:buClr>
-              <a:buFont typeface="+mj-lt"/>
-              <a:buAutoNum type="arabicPeriod"/>
-            </a:pPr>
-            <a:r>
-              <a:rPr lang="en-US" sz="1800" b="1" dirty="0"/>
-              <a:t>Calculate </a:t>
-            </a:r>
-            <a:r>
-              <a:rPr lang="en-US" sz="1800" dirty="0"/>
-              <a:t>for each observation a concern score between 0 and 1. </a:t>
-            </a:r>
-            <a:r>
-              <a:rPr lang="en-US" sz="1800" b="1" dirty="0"/>
-              <a:t>The higher, the more probable </a:t>
-            </a:r>
-            <a:r>
-              <a:rPr lang="en-US" sz="1800" dirty="0"/>
-              <a:t>the changes impacted forwarding.</a:t>
-            </a:r>
-          </a:p>
-          <a:p>
-            <a:pPr marL="342900" indent="-342900">
-              <a:spcBef>
-                <a:spcPts val="1800"/>
-              </a:spcBef>
-              <a:buClr>
-                <a:schemeClr val="accent2"/>
-              </a:buClr>
-              <a:buFont typeface="+mj-lt"/>
-              <a:buAutoNum type="arabicPeriod"/>
-            </a:pPr>
-            <a:r>
-              <a:rPr lang="en-US" sz="1800" b="1" dirty="0"/>
-              <a:t>Unify </a:t>
-            </a:r>
-            <a:r>
-              <a:rPr lang="en-US" sz="1800" dirty="0"/>
-              <a:t>several concerns for one VPN connectivity service to one alert identifier. </a:t>
-            </a:r>
-          </a:p>
-        </p:txBody>
-      </p:sp>
-      <p:pic>
-        <p:nvPicPr>
-          <p:cNvPr id="12" name="Picture 11">
-            <a:extLst>
-              <a:ext uri="{FF2B5EF4-FFF2-40B4-BE49-F238E27FC236}">
-                <a16:creationId xmlns:a16="http://schemas.microsoft.com/office/drawing/2014/main" id="{640B9623-81DE-4C90-ABB0-B84BCC0CD700}"/>
-              </a:ext>
-            </a:extLst>
-          </p:cNvPr>
-          <p:cNvPicPr>
-            <a:picLocks noChangeAspect="1"/>
-          </p:cNvPicPr>
-          <p:nvPr/>
-        </p:nvPicPr>
-        <p:blipFill>
-          <a:blip r:embed="rId2"/>
-          <a:stretch>
-            <a:fillRect/>
-          </a:stretch>
-        </p:blipFill>
-        <p:spPr>
-          <a:xfrm>
-            <a:off x="7988531" y="549786"/>
-            <a:ext cx="3490169" cy="5758427"/>
-          </a:xfrm>
-          <a:prstGeom prst="rect">
-            <a:avLst/>
-          </a:prstGeom>
-        </p:spPr>
-      </p:pic>
-      <p:sp>
-        <p:nvSpPr>
-          <p:cNvPr id="5" name="Title 1">
-            <a:extLst>
-              <a:ext uri="{FF2B5EF4-FFF2-40B4-BE49-F238E27FC236}">
-                <a16:creationId xmlns:a16="http://schemas.microsoft.com/office/drawing/2014/main" id="{8CAEE21E-0CF2-4355-A68A-655C5FDE8F93}"/>
-              </a:ext>
-            </a:extLst>
-          </p:cNvPr>
-          <p:cNvSpPr txBox="1">
-            <a:spLocks/>
-          </p:cNvSpPr>
-          <p:nvPr/>
-        </p:nvSpPr>
-        <p:spPr bwMode="black">
-          <a:xfrm>
-            <a:off x="838200" y="365125"/>
-            <a:ext cx="10515600" cy="1325563"/>
-          </a:xfrm>
-          <a:prstGeom prst="rect">
-            <a:avLst/>
-          </a:prstGeom>
-        </p:spPr>
-        <p:txBody>
-          <a:bodyPr vert="horz" lIns="91440" tIns="45720" rIns="91440" bIns="45720" rtlCol="0" anchor="ctr">
-            <a:normAutofit/>
-          </a:bodyPr>
-          <a:lstStyle>
-            <a:lvl1pPr algn="l" defTabSz="914400" rtl="0" eaLnBrk="1" latinLnBrk="0" hangingPunct="1">
-              <a:lnSpc>
-                <a:spcPct val="90000"/>
-              </a:lnSpc>
-              <a:spcBef>
-                <a:spcPct val="0"/>
-              </a:spcBef>
-              <a:buNone/>
-              <a:defRPr sz="4400" kern="1200">
-                <a:solidFill>
-                  <a:schemeClr val="tx1"/>
-                </a:solidFill>
-                <a:latin typeface="+mj-lt"/>
-                <a:ea typeface="+mj-ea"/>
-                <a:cs typeface="+mj-cs"/>
-              </a:defRPr>
-            </a:lvl1pPr>
-          </a:lstStyle>
-          <a:p>
-            <a:r>
-              <a:rPr lang="en-US" sz="2800" b="1" dirty="0"/>
-              <a:t>From Network to Alert Event</a:t>
-            </a:r>
-            <a:br>
-              <a:rPr lang="en-US" sz="3600" dirty="0"/>
-            </a:br>
-            <a:r>
-              <a:rPr lang="en-US" sz="2700" dirty="0">
-                <a:solidFill>
-                  <a:schemeClr val="bg2">
-                    <a:lumMod val="75000"/>
-                  </a:schemeClr>
-                </a:solidFill>
-              </a:rPr>
-              <a:t>Observe multiple perspectives at different times</a:t>
-            </a:r>
-            <a:endParaRPr lang="en-US" sz="2700" dirty="0">
-              <a:solidFill>
-                <a:srgbClr val="FF0000"/>
-              </a:solidFill>
-            </a:endParaRPr>
-          </a:p>
-        </p:txBody>
-      </p:sp>
-      <p:sp>
-        <p:nvSpPr>
-          <p:cNvPr id="6" name="Slide Number Placeholder 1">
-            <a:extLst>
-              <a:ext uri="{FF2B5EF4-FFF2-40B4-BE49-F238E27FC236}">
-                <a16:creationId xmlns:a16="http://schemas.microsoft.com/office/drawing/2014/main" id="{F737EB12-95E0-44D8-968E-78326B862682}"/>
-              </a:ext>
-            </a:extLst>
-          </p:cNvPr>
-          <p:cNvSpPr>
-            <a:spLocks noGrp="1"/>
-          </p:cNvSpPr>
-          <p:nvPr>
-            <p:ph type="sldNum" sz="quarter" idx="12"/>
-          </p:nvPr>
-        </p:nvSpPr>
-        <p:spPr>
-          <a:xfrm>
-            <a:off x="11587892" y="6361637"/>
-            <a:ext cx="414251" cy="365125"/>
-          </a:xfrm>
-        </p:spPr>
-        <p:txBody>
-          <a:bodyPr/>
-          <a:lstStyle/>
-          <a:p>
-            <a:fld id="{FC4AC485-25DE-431E-B345-9C0A15BB7F8A}" type="slidenum">
-              <a:rPr lang="de-CH" sz="1400" smtClean="0"/>
-              <a:t>19</a:t>
-            </a:fld>
-            <a:endParaRPr lang="de-CH" sz="1400" dirty="0"/>
-          </a:p>
-        </p:txBody>
-      </p:sp>
-    </p:spTree>
-    <p:extLst>
-      <p:ext uri="{BB962C8B-B14F-4D97-AF65-F5344CB8AC3E}">
-        <p14:creationId xmlns:p14="http://schemas.microsoft.com/office/powerpoint/2010/main" val="3241116723"/>
       </p:ext>
     </p:extLst>
   </p:cSld>
@@ -17853,6 +18313,311 @@
 </file>
 
 <file path=ppt/slides/slide20.xml><?xml version="1.0" encoding="utf-8"?>
+<p:sld xmlns:a="http://schemas.openxmlformats.org/drawingml/2006/main" xmlns:r="http://schemas.openxmlformats.org/officeDocument/2006/relationships" xmlns:p="http://schemas.openxmlformats.org/presentationml/2006/main">
+  <p:cSld>
+    <p:spTree>
+      <p:nvGrpSpPr>
+        <p:cNvPr id="1" name=""/>
+        <p:cNvGrpSpPr/>
+        <p:nvPr/>
+      </p:nvGrpSpPr>
+      <p:grpSpPr>
+        <a:xfrm>
+          <a:off x="0" y="0"/>
+          <a:ext cx="0" cy="0"/>
+          <a:chOff x="0" y="0"/>
+          <a:chExt cx="0" cy="0"/>
+        </a:xfrm>
+      </p:grpSpPr>
+      <p:sp>
+        <p:nvSpPr>
+          <p:cNvPr id="4" name="Content Placeholder 1">
+            <a:extLst>
+              <a:ext uri="{FF2B5EF4-FFF2-40B4-BE49-F238E27FC236}">
+                <a16:creationId xmlns:a16="http://schemas.microsoft.com/office/drawing/2014/main" id="{D81DEC37-A600-4F6C-AE22-C81D97BEC259}"/>
+              </a:ext>
+            </a:extLst>
+          </p:cNvPr>
+          <p:cNvSpPr>
+            <a:spLocks noGrp="1"/>
+          </p:cNvSpPr>
+          <p:nvPr>
+            <p:ph idx="1"/>
+          </p:nvPr>
+        </p:nvSpPr>
+        <p:spPr>
+          <a:xfrm>
+            <a:off x="838200" y="2036618"/>
+            <a:ext cx="6518097" cy="4137532"/>
+          </a:xfrm>
+        </p:spPr>
+        <p:txBody>
+          <a:bodyPr/>
+          <a:lstStyle/>
+          <a:p>
+            <a:pPr marL="342900" indent="-342900">
+              <a:spcBef>
+                <a:spcPts val="2400"/>
+              </a:spcBef>
+              <a:buClr>
+                <a:schemeClr val="accent2"/>
+              </a:buClr>
+              <a:buFont typeface="+mj-lt"/>
+              <a:buAutoNum type="arabicPeriod"/>
+            </a:pPr>
+            <a:r>
+              <a:rPr lang="en-US" sz="1800" b="1" dirty="0"/>
+              <a:t>A single link </a:t>
+            </a:r>
+            <a:r>
+              <a:rPr lang="en-US" sz="1800" b="1"/>
+              <a:t>down </a:t>
+            </a:r>
+            <a:r>
+              <a:rPr lang="en-US" sz="1800"/>
+              <a:t>results </a:t>
+            </a:r>
+            <a:r>
+              <a:rPr lang="en-US" sz="1800" dirty="0"/>
+              <a:t>in multiple device topology, control-plane and forwarding-plane events being exposed at different times.</a:t>
+            </a:r>
+          </a:p>
+          <a:p>
+            <a:pPr marL="342900" indent="-342900">
+              <a:spcBef>
+                <a:spcPts val="1800"/>
+              </a:spcBef>
+              <a:buClr>
+                <a:schemeClr val="accent2"/>
+              </a:buClr>
+              <a:buFont typeface="+mj-lt"/>
+              <a:buAutoNum type="arabicPeriod"/>
+            </a:pPr>
+            <a:r>
+              <a:rPr lang="en-US" sz="1800" b="1" dirty="0"/>
+              <a:t>Determine </a:t>
+            </a:r>
+            <a:r>
+              <a:rPr lang="en-US" sz="1800" dirty="0"/>
+              <a:t>which interfaces and BGP </a:t>
+            </a:r>
+            <a:r>
+              <a:rPr lang="en-US" sz="1800" dirty="0" err="1"/>
+              <a:t>peerings</a:t>
+            </a:r>
+            <a:r>
+              <a:rPr lang="en-US" sz="1800" dirty="0"/>
+              <a:t> are being used first and then observe state. </a:t>
+            </a:r>
+            <a:r>
+              <a:rPr lang="en-US" sz="1800" b="1" dirty="0"/>
+              <a:t>Observe </a:t>
+            </a:r>
+            <a:r>
+              <a:rPr lang="en-US" sz="1800" dirty="0"/>
+              <a:t>BGP withdrawals and updates, traffic drop spikes and missing traffic. Generate multiple concerns.</a:t>
+            </a:r>
+          </a:p>
+          <a:p>
+            <a:pPr marL="342900" indent="-342900">
+              <a:spcBef>
+                <a:spcPts val="1800"/>
+              </a:spcBef>
+              <a:buClr>
+                <a:schemeClr val="accent2"/>
+              </a:buClr>
+              <a:buFont typeface="+mj-lt"/>
+              <a:buAutoNum type="arabicPeriod"/>
+            </a:pPr>
+            <a:r>
+              <a:rPr lang="en-US" sz="1800" b="1" dirty="0"/>
+              <a:t>Calculate </a:t>
+            </a:r>
+            <a:r>
+              <a:rPr lang="en-US" sz="1800" dirty="0"/>
+              <a:t>for each observation a concern score between 0 and 1. </a:t>
+            </a:r>
+            <a:r>
+              <a:rPr lang="en-US" sz="1800" b="1" dirty="0"/>
+              <a:t>The higher, the more probable </a:t>
+            </a:r>
+            <a:r>
+              <a:rPr lang="en-US" sz="1800" dirty="0"/>
+              <a:t>the changes impacted forwarding.</a:t>
+            </a:r>
+          </a:p>
+          <a:p>
+            <a:pPr marL="342900" indent="-342900">
+              <a:spcBef>
+                <a:spcPts val="1800"/>
+              </a:spcBef>
+              <a:buClr>
+                <a:schemeClr val="accent2"/>
+              </a:buClr>
+              <a:buFont typeface="+mj-lt"/>
+              <a:buAutoNum type="arabicPeriod"/>
+            </a:pPr>
+            <a:r>
+              <a:rPr lang="en-US" sz="1800" b="1" dirty="0"/>
+              <a:t>Unify </a:t>
+            </a:r>
+            <a:r>
+              <a:rPr lang="en-US" sz="1800" dirty="0"/>
+              <a:t>several concerns for one VPN connectivity service to one alert identifier. </a:t>
+            </a:r>
+          </a:p>
+        </p:txBody>
+      </p:sp>
+      <p:pic>
+        <p:nvPicPr>
+          <p:cNvPr id="12" name="Picture 11">
+            <a:extLst>
+              <a:ext uri="{FF2B5EF4-FFF2-40B4-BE49-F238E27FC236}">
+                <a16:creationId xmlns:a16="http://schemas.microsoft.com/office/drawing/2014/main" id="{640B9623-81DE-4C90-ABB0-B84BCC0CD700}"/>
+              </a:ext>
+            </a:extLst>
+          </p:cNvPr>
+          <p:cNvPicPr>
+            <a:picLocks noChangeAspect="1"/>
+          </p:cNvPicPr>
+          <p:nvPr/>
+        </p:nvPicPr>
+        <p:blipFill>
+          <a:blip r:embed="rId2"/>
+          <a:stretch>
+            <a:fillRect/>
+          </a:stretch>
+        </p:blipFill>
+        <p:spPr>
+          <a:xfrm>
+            <a:off x="7988531" y="549786"/>
+            <a:ext cx="3490169" cy="5758427"/>
+          </a:xfrm>
+          <a:prstGeom prst="rect">
+            <a:avLst/>
+          </a:prstGeom>
+        </p:spPr>
+      </p:pic>
+      <p:sp>
+        <p:nvSpPr>
+          <p:cNvPr id="5" name="Title 1">
+            <a:extLst>
+              <a:ext uri="{FF2B5EF4-FFF2-40B4-BE49-F238E27FC236}">
+                <a16:creationId xmlns:a16="http://schemas.microsoft.com/office/drawing/2014/main" id="{8CAEE21E-0CF2-4355-A68A-655C5FDE8F93}"/>
+              </a:ext>
+            </a:extLst>
+          </p:cNvPr>
+          <p:cNvSpPr txBox="1">
+            <a:spLocks/>
+          </p:cNvSpPr>
+          <p:nvPr/>
+        </p:nvSpPr>
+        <p:spPr bwMode="black">
+          <a:xfrm>
+            <a:off x="838200" y="365125"/>
+            <a:ext cx="10515600" cy="1325563"/>
+          </a:xfrm>
+          <a:prstGeom prst="rect">
+            <a:avLst/>
+          </a:prstGeom>
+        </p:spPr>
+        <p:txBody>
+          <a:bodyPr vert="horz" lIns="91440" tIns="45720" rIns="91440" bIns="45720" rtlCol="0" anchor="ctr">
+            <a:normAutofit/>
+          </a:bodyPr>
+          <a:lstStyle>
+            <a:lvl1pPr algn="l" defTabSz="914400" rtl="0" eaLnBrk="1" latinLnBrk="0" hangingPunct="1">
+              <a:lnSpc>
+                <a:spcPct val="90000"/>
+              </a:lnSpc>
+              <a:spcBef>
+                <a:spcPct val="0"/>
+              </a:spcBef>
+              <a:buNone/>
+              <a:defRPr sz="4400" kern="1200">
+                <a:solidFill>
+                  <a:schemeClr val="tx1"/>
+                </a:solidFill>
+                <a:latin typeface="+mj-lt"/>
+                <a:ea typeface="+mj-ea"/>
+                <a:cs typeface="+mj-cs"/>
+              </a:defRPr>
+            </a:lvl1pPr>
+          </a:lstStyle>
+          <a:p>
+            <a:r>
+              <a:rPr lang="en-US" sz="2800" b="1" dirty="0"/>
+              <a:t>From Network to Alert Event</a:t>
+            </a:r>
+            <a:br>
+              <a:rPr lang="en-US" sz="3600" dirty="0"/>
+            </a:br>
+            <a:r>
+              <a:rPr lang="en-US" sz="2700" dirty="0">
+                <a:solidFill>
+                  <a:schemeClr val="bg2">
+                    <a:lumMod val="75000"/>
+                  </a:schemeClr>
+                </a:solidFill>
+              </a:rPr>
+              <a:t>Observe multiple perspectives at different times</a:t>
+            </a:r>
+            <a:endParaRPr lang="en-US" sz="2700" dirty="0">
+              <a:solidFill>
+                <a:srgbClr val="FF0000"/>
+              </a:solidFill>
+            </a:endParaRPr>
+          </a:p>
+        </p:txBody>
+      </p:sp>
+      <p:sp>
+        <p:nvSpPr>
+          <p:cNvPr id="6" name="Slide Number Placeholder 1">
+            <a:extLst>
+              <a:ext uri="{FF2B5EF4-FFF2-40B4-BE49-F238E27FC236}">
+                <a16:creationId xmlns:a16="http://schemas.microsoft.com/office/drawing/2014/main" id="{F737EB12-95E0-44D8-968E-78326B862682}"/>
+              </a:ext>
+            </a:extLst>
+          </p:cNvPr>
+          <p:cNvSpPr>
+            <a:spLocks noGrp="1"/>
+          </p:cNvSpPr>
+          <p:nvPr>
+            <p:ph type="sldNum" sz="quarter" idx="12"/>
+          </p:nvPr>
+        </p:nvSpPr>
+        <p:spPr>
+          <a:xfrm>
+            <a:off x="11587892" y="6361637"/>
+            <a:ext cx="414251" cy="365125"/>
+          </a:xfrm>
+        </p:spPr>
+        <p:txBody>
+          <a:bodyPr/>
+          <a:lstStyle/>
+          <a:p>
+            <a:fld id="{FC4AC485-25DE-431E-B345-9C0A15BB7F8A}" type="slidenum">
+              <a:rPr lang="de-CH" sz="1400" smtClean="0"/>
+              <a:t>20</a:t>
+            </a:fld>
+            <a:endParaRPr lang="de-CH" sz="1400" dirty="0"/>
+          </a:p>
+        </p:txBody>
+      </p:sp>
+    </p:spTree>
+    <p:extLst>
+      <p:ext uri="{BB962C8B-B14F-4D97-AF65-F5344CB8AC3E}">
+        <p14:creationId xmlns:p14="http://schemas.microsoft.com/office/powerpoint/2010/main" val="3241116723"/>
+      </p:ext>
+    </p:extLst>
+  </p:cSld>
+  <p:clrMapOvr>
+    <a:masterClrMapping/>
+  </p:clrMapOvr>
+</p:sld>
+</file>
+
+<file path=ppt/slides/slide21.xml><?xml version="1.0" encoding="utf-8"?>
 <p:sld xmlns:a="http://schemas.openxmlformats.org/drawingml/2006/main" xmlns:r="http://schemas.openxmlformats.org/officeDocument/2006/relationships" xmlns:p="http://schemas.openxmlformats.org/presentationml/2006/main">
   <p:cSld>
     <p:spTree>
@@ -19008,7 +19773,7 @@
           <a:p>
             <a:fld id="{FC4AC485-25DE-431E-B345-9C0A15BB7F8A}" type="slidenum">
               <a:rPr lang="de-CH" sz="1400" smtClean="0"/>
-              <a:t>20</a:t>
+              <a:t>21</a:t>
             </a:fld>
             <a:endParaRPr lang="de-CH" sz="1400" dirty="0"/>
           </a:p>
@@ -19746,7 +20511,7 @@
 </p:sld>
 </file>
 
-<file path=ppt/slides/slide21.xml><?xml version="1.0" encoding="utf-8"?>
+<file path=ppt/slides/slide22.xml><?xml version="1.0" encoding="utf-8"?>
 <p:sld xmlns:a="http://schemas.openxmlformats.org/drawingml/2006/main" xmlns:r="http://schemas.openxmlformats.org/officeDocument/2006/relationships" xmlns:p="http://schemas.openxmlformats.org/presentationml/2006/main">
   <p:cSld>
     <p:spTree>
@@ -20811,7 +21576,7 @@
           <a:p>
             <a:fld id="{FC4AC485-25DE-431E-B345-9C0A15BB7F8A}" type="slidenum">
               <a:rPr lang="de-CH" sz="1400" smtClean="0"/>
-              <a:t>21</a:t>
+              <a:t>22</a:t>
             </a:fld>
             <a:endParaRPr lang="de-CH" sz="1400" dirty="0"/>
           </a:p>
@@ -20830,7 +21595,7 @@
 </p:sld>
 </file>
 
-<file path=ppt/slides/slide22.xml><?xml version="1.0" encoding="utf-8"?>
+<file path=ppt/slides/slide23.xml><?xml version="1.0" encoding="utf-8"?>
 <p:sld xmlns:a="http://schemas.openxmlformats.org/drawingml/2006/main" xmlns:r="http://schemas.openxmlformats.org/officeDocument/2006/relationships" xmlns:p="http://schemas.openxmlformats.org/presentationml/2006/main">
   <p:cSld>
     <p:spTree>
@@ -21033,7 +21798,7 @@
           <a:p>
             <a:fld id="{FC4AC485-25DE-431E-B345-9C0A15BB7F8A}" type="slidenum">
               <a:rPr lang="de-CH" sz="1400" smtClean="0"/>
-              <a:t>22</a:t>
+              <a:t>23</a:t>
             </a:fld>
             <a:endParaRPr lang="de-CH" sz="1400" dirty="0"/>
           </a:p>
@@ -21052,7 +21817,7 @@
 </p:sld>
 </file>
 
-<file path=ppt/slides/slide23.xml><?xml version="1.0" encoding="utf-8"?>
+<file path=ppt/slides/slide24.xml><?xml version="1.0" encoding="utf-8"?>
 <p:sld xmlns:a="http://schemas.openxmlformats.org/drawingml/2006/main" xmlns:r="http://schemas.openxmlformats.org/officeDocument/2006/relationships" xmlns:p="http://schemas.openxmlformats.org/presentationml/2006/main">
   <p:cSld>
     <p:spTree>
@@ -22673,7 +23438,7 @@
           <a:p>
             <a:fld id="{FC4AC485-25DE-431E-B345-9C0A15BB7F8A}" type="slidenum">
               <a:rPr lang="de-CH" sz="1400" smtClean="0"/>
-              <a:t>23</a:t>
+              <a:t>24</a:t>
             </a:fld>
             <a:endParaRPr lang="de-CH" sz="1400" dirty="0"/>
           </a:p>
@@ -22692,7 +23457,7 @@
 </p:sld>
 </file>
 
-<file path=ppt/slides/slide24.xml><?xml version="1.0" encoding="utf-8"?>
+<file path=ppt/slides/slide25.xml><?xml version="1.0" encoding="utf-8"?>
 <p:sld xmlns:a="http://schemas.openxmlformats.org/drawingml/2006/main" xmlns:r="http://schemas.openxmlformats.org/officeDocument/2006/relationships" xmlns:p="http://schemas.openxmlformats.org/presentationml/2006/main">
   <p:cSld>
     <p:spTree>
@@ -23901,7 +24666,7 @@
           <a:p>
             <a:fld id="{FC4AC485-25DE-431E-B345-9C0A15BB7F8A}" type="slidenum">
               <a:rPr lang="de-CH" sz="1400" smtClean="0"/>
-              <a:t>24</a:t>
+              <a:t>25</a:t>
             </a:fld>
             <a:endParaRPr lang="de-CH" sz="1400" dirty="0"/>
           </a:p>
@@ -23920,7 +24685,7 @@
 </p:sld>
 </file>
 
-<file path=ppt/slides/slide25.xml><?xml version="1.0" encoding="utf-8"?>
+<file path=ppt/slides/slide26.xml><?xml version="1.0" encoding="utf-8"?>
 <p:sld xmlns:a="http://schemas.openxmlformats.org/drawingml/2006/main" xmlns:r="http://schemas.openxmlformats.org/officeDocument/2006/relationships" xmlns:p="http://schemas.openxmlformats.org/presentationml/2006/main">
   <p:cSld>
     <p:spTree>
@@ -24416,7 +25181,7 @@
           <a:p>
             <a:fld id="{FC4AC485-25DE-431E-B345-9C0A15BB7F8A}" type="slidenum">
               <a:rPr lang="de-CH" sz="1400" smtClean="0"/>
-              <a:t>25</a:t>
+              <a:t>26</a:t>
             </a:fld>
             <a:endParaRPr lang="de-CH" sz="1400" dirty="0"/>
           </a:p>
@@ -27792,14 +28557,7 @@
           <a:p>
             <a:r>
               <a:rPr lang="en-US" sz="2000" dirty="0"/>
-              <a:t>Propose changes in netconf notification header </a:t>
-            </a:r>
-            <a:br>
-              <a:rPr lang="en-US" sz="2000" dirty="0"/>
-            </a:br>
-            <a:r>
-              <a:rPr lang="en-US" sz="2000" dirty="0"/>
-              <a:t>to validate properly in </a:t>
+              <a:t>Propose changes in netconf notification header to validate properly in </a:t>
             </a:r>
             <a:r>
               <a:rPr lang="en-US" sz="2000" dirty="0" err="1"/>
@@ -27810,14 +28568,7 @@
           <a:p>
             <a:r>
               <a:rPr lang="en-US" sz="2000" dirty="0"/>
-              <a:t>Enable schema validation and data serialization </a:t>
-            </a:r>
-            <a:br>
-              <a:rPr lang="en-US" sz="2000" dirty="0"/>
-            </a:br>
-            <a:r>
-              <a:rPr lang="en-US" sz="2000" dirty="0"/>
-              <a:t>in Apache Kafka</a:t>
+              <a:t>Enable schema validation and data serialization in Apache Kafka</a:t>
             </a:r>
           </a:p>
         </p:txBody>
@@ -27888,10 +28639,10 @@
       </p:pic>
       <p:sp>
         <p:nvSpPr>
-          <p:cNvPr id="6" name="Subtitle 4">
+          <p:cNvPr id="4" name="Subtitle 4">
             <a:extLst>
               <a:ext uri="{FF2B5EF4-FFF2-40B4-BE49-F238E27FC236}">
-                <a16:creationId xmlns:a16="http://schemas.microsoft.com/office/drawing/2014/main" id="{7C3B84B0-CEE6-9508-972D-6095E0E01E98}"/>
+                <a16:creationId xmlns:a16="http://schemas.microsoft.com/office/drawing/2014/main" id="{8261D168-84A4-F056-4C42-0ABC1EBF21E6}"/>
               </a:ext>
             </a:extLst>
           </p:cNvPr>
@@ -27902,8 +28653,8 @@
         </p:nvSpPr>
         <p:spPr>
           <a:xfrm>
-            <a:off x="838200" y="5212081"/>
-            <a:ext cx="11163943" cy="1149556"/>
+            <a:off x="838200" y="5574325"/>
+            <a:ext cx="11163943" cy="787312"/>
           </a:xfrm>
           <a:prstGeom prst="rect">
             <a:avLst/>
@@ -27911,7 +28662,7 @@
         </p:spPr>
         <p:txBody>
           <a:bodyPr vert="horz" lIns="91440" tIns="45720" rIns="91440" bIns="45720" rtlCol="0">
-            <a:normAutofit fontScale="40000" lnSpcReduction="20000"/>
+            <a:normAutofit fontScale="25000" lnSpcReduction="20000"/>
           </a:bodyPr>
           <a:lstStyle>
             <a:lvl1pPr marL="228600" indent="-228600" algn="l" defTabSz="914400" rtl="0" eaLnBrk="1" latinLnBrk="0" hangingPunct="1">

</xml_diff>

<commit_message>
input from Jean, Alex and Olga merged
</commit_message>
<xml_diff>
--- a/117/Side-Meetings/ietf117-netconf-yang-push-data-mesh-integration.pptx
+++ b/117/Side-Meetings/ietf117-netconf-yang-push-data-mesh-integration.pptx
@@ -143,7 +143,7 @@
 <file path=ppt/revisionInfo.xml><?xml version="1.0" encoding="utf-8"?>
 <p1510:revInfo xmlns:a="http://schemas.openxmlformats.org/drawingml/2006/main" xmlns:r="http://schemas.openxmlformats.org/officeDocument/2006/relationships" xmlns:p1510="http://schemas.microsoft.com/office/powerpoint/2015/10/main">
   <p1510:revLst>
-    <p1510:client id="{40188488-A9E1-4155-BFF1-5EF2EE12E93E}" v="43" dt="2023-07-24T17:15:33.382"/>
+    <p1510:client id="{40188488-A9E1-4155-BFF1-5EF2EE12E93E}" v="46" dt="2023-07-24T17:44:03.183"/>
   </p1510:revLst>
 </p1510:revInfo>
 </file>
@@ -153,7 +153,7 @@
   <pc:docChgLst>
     <pc:chgData name="Graf Thomas, INI-NET-VNC-HCS" userId="487bc3e3-9ce7-4cdd-b7b4-8899ea88d289" providerId="ADAL" clId="{40188488-A9E1-4155-BFF1-5EF2EE12E93E}"/>
     <pc:docChg chg="undo custSel addSld delSld modSld sldOrd">
-      <pc:chgData name="Graf Thomas, INI-NET-VNC-HCS" userId="487bc3e3-9ce7-4cdd-b7b4-8899ea88d289" providerId="ADAL" clId="{40188488-A9E1-4155-BFF1-5EF2EE12E93E}" dt="2023-07-24T17:16:36.535" v="2446" actId="47"/>
+      <pc:chgData name="Graf Thomas, INI-NET-VNC-HCS" userId="487bc3e3-9ce7-4cdd-b7b4-8899ea88d289" providerId="ADAL" clId="{40188488-A9E1-4155-BFF1-5EF2EE12E93E}" dt="2023-07-24T17:46:34.998" v="2479" actId="108"/>
       <pc:docMkLst>
         <pc:docMk/>
       </pc:docMkLst>
@@ -766,7 +766,7 @@
         </pc:cxnChg>
       </pc:sldChg>
       <pc:sldChg chg="addSp delSp modSp add mod">
-        <pc:chgData name="Graf Thomas, INI-NET-VNC-HCS" userId="487bc3e3-9ce7-4cdd-b7b4-8899ea88d289" providerId="ADAL" clId="{40188488-A9E1-4155-BFF1-5EF2EE12E93E}" dt="2023-07-24T14:52:15.313" v="1099" actId="14100"/>
+        <pc:chgData name="Graf Thomas, INI-NET-VNC-HCS" userId="487bc3e3-9ce7-4cdd-b7b4-8899ea88d289" providerId="ADAL" clId="{40188488-A9E1-4155-BFF1-5EF2EE12E93E}" dt="2023-07-24T17:44:03.182" v="2450" actId="14100"/>
         <pc:sldMkLst>
           <pc:docMk/>
           <pc:sldMk cId="109474821" sldId="2145706232"/>
@@ -827,8 +827,8 @@
             <ac:picMk id="2" creationId="{6CA0CC97-2654-4462-3AED-3AA610AA319B}"/>
           </ac:picMkLst>
         </pc:picChg>
-        <pc:picChg chg="add mod">
-          <ac:chgData name="Graf Thomas, INI-NET-VNC-HCS" userId="487bc3e3-9ce7-4cdd-b7b4-8899ea88d289" providerId="ADAL" clId="{40188488-A9E1-4155-BFF1-5EF2EE12E93E}" dt="2023-07-24T14:37:46.200" v="373" actId="14100"/>
+        <pc:picChg chg="add del mod">
+          <ac:chgData name="Graf Thomas, INI-NET-VNC-HCS" userId="487bc3e3-9ce7-4cdd-b7b4-8899ea88d289" providerId="ADAL" clId="{40188488-A9E1-4155-BFF1-5EF2EE12E93E}" dt="2023-07-24T17:43:50.519" v="2447" actId="478"/>
           <ac:picMkLst>
             <pc:docMk/>
             <pc:sldMk cId="109474821" sldId="2145706232"/>
@@ -849,6 +849,14 @@
             <pc:docMk/>
             <pc:sldMk cId="109474821" sldId="2145706232"/>
             <ac:picMk id="1025" creationId="{FF355033-B1E1-DF9D-C701-CD0D622A92B0}"/>
+          </ac:picMkLst>
+        </pc:picChg>
+        <pc:picChg chg="add mod">
+          <ac:chgData name="Graf Thomas, INI-NET-VNC-HCS" userId="487bc3e3-9ce7-4cdd-b7b4-8899ea88d289" providerId="ADAL" clId="{40188488-A9E1-4155-BFF1-5EF2EE12E93E}" dt="2023-07-24T17:44:03.182" v="2450" actId="14100"/>
+          <ac:picMkLst>
+            <pc:docMk/>
+            <pc:sldMk cId="109474821" sldId="2145706232"/>
+            <ac:picMk id="1026" creationId="{251AF02E-F7C4-5C3C-73B9-611915A99DD2}"/>
           </ac:picMkLst>
         </pc:picChg>
         <pc:picChg chg="add del">
@@ -1097,12 +1105,36 @@
           </ac:picMkLst>
         </pc:picChg>
       </pc:sldChg>
-      <pc:sldChg chg="add">
-        <pc:chgData name="Graf Thomas, INI-NET-VNC-HCS" userId="487bc3e3-9ce7-4cdd-b7b4-8899ea88d289" providerId="ADAL" clId="{40188488-A9E1-4155-BFF1-5EF2EE12E93E}" dt="2023-07-24T14:52:51.849" v="1104"/>
+      <pc:sldChg chg="modSp add mod">
+        <pc:chgData name="Graf Thomas, INI-NET-VNC-HCS" userId="487bc3e3-9ce7-4cdd-b7b4-8899ea88d289" providerId="ADAL" clId="{40188488-A9E1-4155-BFF1-5EF2EE12E93E}" dt="2023-07-24T17:46:34.998" v="2479" actId="108"/>
         <pc:sldMkLst>
           <pc:docMk/>
           <pc:sldMk cId="1912627419" sldId="2145706236"/>
         </pc:sldMkLst>
+        <pc:spChg chg="mod">
+          <ac:chgData name="Graf Thomas, INI-NET-VNC-HCS" userId="487bc3e3-9ce7-4cdd-b7b4-8899ea88d289" providerId="ADAL" clId="{40188488-A9E1-4155-BFF1-5EF2EE12E93E}" dt="2023-07-24T17:46:23.102" v="2469" actId="20577"/>
+          <ac:spMkLst>
+            <pc:docMk/>
+            <pc:sldMk cId="1912627419" sldId="2145706236"/>
+            <ac:spMk id="2" creationId="{FF20F271-6F0D-4AC0-BB1D-F5C338165C13}"/>
+          </ac:spMkLst>
+        </pc:spChg>
+        <pc:spChg chg="mod">
+          <ac:chgData name="Graf Thomas, INI-NET-VNC-HCS" userId="487bc3e3-9ce7-4cdd-b7b4-8899ea88d289" providerId="ADAL" clId="{40188488-A9E1-4155-BFF1-5EF2EE12E93E}" dt="2023-07-24T17:46:34.998" v="2479" actId="108"/>
+          <ac:spMkLst>
+            <pc:docMk/>
+            <pc:sldMk cId="1912627419" sldId="2145706236"/>
+            <ac:spMk id="3" creationId="{29C0DFD4-432D-4B0C-93DF-790441DCF5B9}"/>
+          </ac:spMkLst>
+        </pc:spChg>
+        <pc:spChg chg="mod">
+          <ac:chgData name="Graf Thomas, INI-NET-VNC-HCS" userId="487bc3e3-9ce7-4cdd-b7b4-8899ea88d289" providerId="ADAL" clId="{40188488-A9E1-4155-BFF1-5EF2EE12E93E}" dt="2023-07-24T17:46:26.489" v="2472" actId="14100"/>
+          <ac:spMkLst>
+            <pc:docMk/>
+            <pc:sldMk cId="1912627419" sldId="2145706236"/>
+            <ac:spMk id="16" creationId="{4D0044F8-1C12-4A59-883A-7B56B9370029}"/>
+          </ac:spMkLst>
+        </pc:spChg>
       </pc:sldChg>
       <pc:sldChg chg="add">
         <pc:chgData name="Graf Thomas, INI-NET-VNC-HCS" userId="487bc3e3-9ce7-4cdd-b7b4-8899ea88d289" providerId="ADAL" clId="{40188488-A9E1-4155-BFF1-5EF2EE12E93E}" dt="2023-07-24T15:04:23.164" v="2212"/>
@@ -1119,7 +1151,7 @@
         </pc:sldMkLst>
       </pc:sldChg>
       <pc:sldChg chg="modSp add mod">
-        <pc:chgData name="Graf Thomas, INI-NET-VNC-HCS" userId="487bc3e3-9ce7-4cdd-b7b4-8899ea88d289" providerId="ADAL" clId="{40188488-A9E1-4155-BFF1-5EF2EE12E93E}" dt="2023-07-24T17:16:26.766" v="2445" actId="20577"/>
+        <pc:chgData name="Graf Thomas, INI-NET-VNC-HCS" userId="487bc3e3-9ce7-4cdd-b7b4-8899ea88d289" providerId="ADAL" clId="{40188488-A9E1-4155-BFF1-5EF2EE12E93E}" dt="2023-07-24T17:45:08.765" v="2451" actId="14100"/>
         <pc:sldMkLst>
           <pc:docMk/>
           <pc:sldMk cId="2425809725" sldId="2145706240"/>
@@ -1146,6 +1178,14 @@
             <pc:docMk/>
             <pc:sldMk cId="2425809725" sldId="2145706240"/>
             <ac:spMk id="6" creationId="{7C3B84B0-CEE6-9508-972D-6095E0E01E98}"/>
+          </ac:spMkLst>
+        </pc:spChg>
+        <pc:spChg chg="mod">
+          <ac:chgData name="Graf Thomas, INI-NET-VNC-HCS" userId="487bc3e3-9ce7-4cdd-b7b4-8899ea88d289" providerId="ADAL" clId="{40188488-A9E1-4155-BFF1-5EF2EE12E93E}" dt="2023-07-24T17:45:08.765" v="2451" actId="14100"/>
+          <ac:spMkLst>
+            <pc:docMk/>
+            <pc:sldMk cId="2425809725" sldId="2145706240"/>
+            <ac:spMk id="16" creationId="{4D0044F8-1C12-4A59-883A-7B56B9370029}"/>
           </ac:spMkLst>
         </pc:spChg>
       </pc:sldChg>
@@ -6362,8 +6402,8 @@
         </p:nvSpPr>
         <p:spPr>
           <a:xfrm>
-            <a:off x="11607800" y="6362700"/>
-            <a:ext cx="414338" cy="365125"/>
+            <a:off x="11479876" y="6362700"/>
+            <a:ext cx="542262" cy="365125"/>
           </a:xfrm>
         </p:spPr>
         <p:txBody>
@@ -6374,7 +6414,7 @@
               <a:rPr lang="en-US" sz="2200" smtClean="0"/>
               <a:t>10</a:t>
             </a:fld>
-            <a:endParaRPr lang="en-US" sz="2200"/>
+            <a:endParaRPr lang="en-US" sz="2200" dirty="0"/>
           </a:p>
         </p:txBody>
       </p:sp>
@@ -6885,7 +6925,39 @@
           <a:p>
             <a:r>
               <a:rPr lang="en-US" sz="2000" b="1" dirty="0"/>
-              <a:t> -03 NETCONF adoption call concluded</a:t>
+              <a:t> -03 NETCONF adoption call for </a:t>
+            </a:r>
+            <a:r>
+              <a:rPr lang="de-CH" sz="2000" b="1" dirty="0"/>
+              <a:t>draft-</a:t>
+            </a:r>
+            <a:r>
+              <a:rPr lang="de-CH" sz="2000" b="1" dirty="0" err="1"/>
+              <a:t>ietf</a:t>
+            </a:r>
+            <a:r>
+              <a:rPr lang="de-CH" sz="2000" b="1" dirty="0"/>
+              <a:t>-netconf-</a:t>
+            </a:r>
+            <a:r>
+              <a:rPr lang="de-CH" sz="2000" b="1" dirty="0" err="1"/>
+              <a:t>yang</a:t>
+            </a:r>
+            <a:r>
+              <a:rPr lang="de-CH" sz="2000" b="1" dirty="0"/>
+              <a:t>-</a:t>
+            </a:r>
+            <a:r>
+              <a:rPr lang="de-CH" sz="2000" b="1" dirty="0" err="1"/>
+              <a:t>notifications-versioning</a:t>
+            </a:r>
+            <a:r>
+              <a:rPr lang="de-CH" sz="2000" b="1" dirty="0"/>
+              <a:t> </a:t>
+            </a:r>
+            <a:r>
+              <a:rPr lang="en-US" sz="2000" b="1" dirty="0"/>
+              <a:t>concluded</a:t>
             </a:r>
           </a:p>
           <a:p>
@@ -6996,7 +7068,7 @@
               <a:rPr lang="en-US" sz="2200" smtClean="0"/>
               <a:t>12</a:t>
             </a:fld>
-            <a:endParaRPr lang="en-US" sz="2200"/>
+            <a:endParaRPr lang="en-US" sz="2200" dirty="0"/>
           </a:p>
         </p:txBody>
       </p:sp>
@@ -27344,10 +27416,10 @@
       </p:sp>
       <p:pic>
         <p:nvPicPr>
-          <p:cNvPr id="10" name="Picture 9">
+          <p:cNvPr id="11" name="Picture 10">
             <a:extLst>
               <a:ext uri="{FF2B5EF4-FFF2-40B4-BE49-F238E27FC236}">
-                <a16:creationId xmlns:a16="http://schemas.microsoft.com/office/drawing/2014/main" id="{F464C6F7-94F9-6A54-4C12-A1348ACB5C7C}"/>
+                <a16:creationId xmlns:a16="http://schemas.microsoft.com/office/drawing/2014/main" id="{8A9F32EA-7668-47FE-EFE0-3718491A23A1}"/>
               </a:ext>
             </a:extLst>
           </p:cNvPr>
@@ -27364,8 +27436,8 @@
         </p:blipFill>
         <p:spPr>
           <a:xfrm>
-            <a:off x="920904" y="1589170"/>
-            <a:ext cx="10745885" cy="2821943"/>
+            <a:off x="920904" y="4483046"/>
+            <a:ext cx="10745885" cy="874825"/>
           </a:xfrm>
           <a:prstGeom prst="rect">
             <a:avLst/>
@@ -27374,32 +27446,62 @@
       </p:pic>
       <p:pic>
         <p:nvPicPr>
-          <p:cNvPr id="11" name="Picture 10">
+          <p:cNvPr id="1026" name="Picture 1">
             <a:extLst>
               <a:ext uri="{FF2B5EF4-FFF2-40B4-BE49-F238E27FC236}">
-                <a16:creationId xmlns:a16="http://schemas.microsoft.com/office/drawing/2014/main" id="{8A9F32EA-7668-47FE-EFE0-3718491A23A1}"/>
+                <a16:creationId xmlns:a16="http://schemas.microsoft.com/office/drawing/2014/main" id="{251AF02E-F7C4-5C3C-73B9-611915A99DD2}"/>
               </a:ext>
             </a:extLst>
           </p:cNvPr>
           <p:cNvPicPr>
-            <a:picLocks noChangeAspect="1"/>
+            <a:picLocks noChangeAspect="1" noChangeArrowheads="1"/>
           </p:cNvPicPr>
           <p:nvPr/>
         </p:nvPicPr>
         <p:blipFill>
-          <a:blip r:embed="rId4"/>
+          <a:blip r:embed="rId4">
+            <a:extLst>
+              <a:ext uri="{28A0092B-C50C-407E-A947-70E740481C1C}">
+                <a14:useLocalDpi xmlns:a14="http://schemas.microsoft.com/office/drawing/2010/main" val="0"/>
+              </a:ext>
+            </a:extLst>
+          </a:blip>
+          <a:srcRect/>
           <a:stretch>
             <a:fillRect/>
           </a:stretch>
         </p:blipFill>
-        <p:spPr>
+        <p:spPr bwMode="auto">
           <a:xfrm>
-            <a:off x="920904" y="4483046"/>
-            <a:ext cx="10745885" cy="874825"/>
+            <a:off x="920905" y="1573728"/>
+            <a:ext cx="6893060" cy="2807827"/>
           </a:xfrm>
           <a:prstGeom prst="rect">
             <a:avLst/>
           </a:prstGeom>
+          <a:noFill/>
+          <a:ln>
+            <a:noFill/>
+          </a:ln>
+          <a:extLst>
+            <a:ext uri="{909E8E84-426E-40DD-AFC4-6F175D3DCCD1}">
+              <a14:hiddenFill xmlns:a14="http://schemas.microsoft.com/office/drawing/2010/main">
+                <a:solidFill>
+                  <a:srgbClr val="FFFFFF"/>
+                </a:solidFill>
+              </a14:hiddenFill>
+            </a:ext>
+            <a:ext uri="{91240B29-F687-4F45-9708-019B960494DF}">
+              <a14:hiddenLine xmlns:a14="http://schemas.microsoft.com/office/drawing/2010/main" w="9525">
+                <a:solidFill>
+                  <a:srgbClr val="000000"/>
+                </a:solidFill>
+                <a:miter lim="800000"/>
+                <a:headEnd/>
+                <a:tailEnd/>
+              </a14:hiddenLine>
+            </a:ext>
+          </a:extLst>
         </p:spPr>
       </p:pic>
     </p:spTree>

</xml_diff>

<commit_message>
corrected next steps in slide 8/9
</commit_message>
<xml_diff>
--- a/117/Side-Meetings/ietf117-netconf-yang-push-data-mesh-integration.pptx
+++ b/117/Side-Meetings/ietf117-netconf-yang-push-data-mesh-integration.pptx
@@ -151,6 +151,68 @@
 <file path=ppt/changesInfos/changesInfo1.xml><?xml version="1.0" encoding="utf-8"?>
 <pc:chgInfo xmlns:a="http://schemas.openxmlformats.org/drawingml/2006/main" xmlns:r="http://schemas.openxmlformats.org/officeDocument/2006/relationships" xmlns:ac="http://schemas.microsoft.com/office/drawing/2013/main/command" xmlns:pc="http://schemas.microsoft.com/office/powerpoint/2013/main/command">
   <pc:docChgLst>
+    <pc:chgData name="Thomas Graf" userId="487bc3e3-9ce7-4cdd-b7b4-8899ea88d289" providerId="ADAL" clId="{B9D0A0E3-578E-40BA-8245-73B11950422A}"/>
+    <pc:docChg chg="modSld">
+      <pc:chgData name="Thomas Graf" userId="487bc3e3-9ce7-4cdd-b7b4-8899ea88d289" providerId="ADAL" clId="{B9D0A0E3-578E-40BA-8245-73B11950422A}" dt="2023-07-25T14:51:46.132" v="51" actId="14100"/>
+      <pc:docMkLst>
+        <pc:docMk/>
+      </pc:docMkLst>
+      <pc:sldChg chg="modSp mod">
+        <pc:chgData name="Thomas Graf" userId="487bc3e3-9ce7-4cdd-b7b4-8899ea88d289" providerId="ADAL" clId="{B9D0A0E3-578E-40BA-8245-73B11950422A}" dt="2023-07-25T14:51:32.079" v="50" actId="20577"/>
+        <pc:sldMkLst>
+          <pc:docMk/>
+          <pc:sldMk cId="505743577" sldId="2145706229"/>
+        </pc:sldMkLst>
+        <pc:spChg chg="mod">
+          <ac:chgData name="Thomas Graf" userId="487bc3e3-9ce7-4cdd-b7b4-8899ea88d289" providerId="ADAL" clId="{B9D0A0E3-578E-40BA-8245-73B11950422A}" dt="2023-07-25T14:51:32.079" v="50" actId="20577"/>
+          <ac:spMkLst>
+            <pc:docMk/>
+            <pc:sldMk cId="505743577" sldId="2145706229"/>
+            <ac:spMk id="2" creationId="{FF20F271-6F0D-4AC0-BB1D-F5C338165C13}"/>
+          </ac:spMkLst>
+        </pc:spChg>
+        <pc:spChg chg="mod">
+          <ac:chgData name="Thomas Graf" userId="487bc3e3-9ce7-4cdd-b7b4-8899ea88d289" providerId="ADAL" clId="{B9D0A0E3-578E-40BA-8245-73B11950422A}" dt="2023-07-25T14:50:46.760" v="0" actId="6549"/>
+          <ac:spMkLst>
+            <pc:docMk/>
+            <pc:sldMk cId="505743577" sldId="2145706229"/>
+            <ac:spMk id="3" creationId="{29C0DFD4-432D-4B0C-93DF-790441DCF5B9}"/>
+          </ac:spMkLst>
+        </pc:spChg>
+      </pc:sldChg>
+      <pc:sldChg chg="modSp mod">
+        <pc:chgData name="Thomas Graf" userId="487bc3e3-9ce7-4cdd-b7b4-8899ea88d289" providerId="ADAL" clId="{B9D0A0E3-578E-40BA-8245-73B11950422A}" dt="2023-07-25T14:51:46.132" v="51" actId="14100"/>
+        <pc:sldMkLst>
+          <pc:docMk/>
+          <pc:sldMk cId="1912627419" sldId="2145706236"/>
+        </pc:sldMkLst>
+        <pc:spChg chg="mod">
+          <ac:chgData name="Thomas Graf" userId="487bc3e3-9ce7-4cdd-b7b4-8899ea88d289" providerId="ADAL" clId="{B9D0A0E3-578E-40BA-8245-73B11950422A}" dt="2023-07-25T14:51:46.132" v="51" actId="14100"/>
+          <ac:spMkLst>
+            <pc:docMk/>
+            <pc:sldMk cId="1912627419" sldId="2145706236"/>
+            <ac:spMk id="16" creationId="{4D0044F8-1C12-4A59-883A-7B56B9370029}"/>
+          </ac:spMkLst>
+        </pc:spChg>
+      </pc:sldChg>
+      <pc:sldChg chg="modSp mod">
+        <pc:chgData name="Thomas Graf" userId="487bc3e3-9ce7-4cdd-b7b4-8899ea88d289" providerId="ADAL" clId="{B9D0A0E3-578E-40BA-8245-73B11950422A}" dt="2023-07-25T14:51:21.466" v="49" actId="20577"/>
+        <pc:sldMkLst>
+          <pc:docMk/>
+          <pc:sldMk cId="2425809725" sldId="2145706240"/>
+        </pc:sldMkLst>
+        <pc:spChg chg="mod">
+          <ac:chgData name="Thomas Graf" userId="487bc3e3-9ce7-4cdd-b7b4-8899ea88d289" providerId="ADAL" clId="{B9D0A0E3-578E-40BA-8245-73B11950422A}" dt="2023-07-25T14:51:21.466" v="49" actId="20577"/>
+          <ac:spMkLst>
+            <pc:docMk/>
+            <pc:sldMk cId="2425809725" sldId="2145706240"/>
+            <ac:spMk id="3" creationId="{29C0DFD4-432D-4B0C-93DF-790441DCF5B9}"/>
+          </ac:spMkLst>
+        </pc:spChg>
+      </pc:sldChg>
+    </pc:docChg>
+  </pc:docChgLst>
+  <pc:docChgLst>
     <pc:chgData name="Graf Thomas, INI-NET-VNC-HCS" userId="487bc3e3-9ce7-4cdd-b7b4-8899ea88d289" providerId="ADAL" clId="{B9D0A0E3-578E-40BA-8245-73B11950422A}"/>
     <pc:docChg chg="addSld modSld">
       <pc:chgData name="Graf Thomas, INI-NET-VNC-HCS" userId="487bc3e3-9ce7-4cdd-b7b4-8899ea88d289" providerId="ADAL" clId="{B9D0A0E3-578E-40BA-8245-73B11950422A}" dt="2023-07-25T00:46:01.147" v="0"/>
@@ -251,7 +313,7 @@
           <a:p>
             <a:fld id="{E5E705E9-673F-4AC4-B29E-A7B26F3B8523}" type="datetimeFigureOut">
               <a:rPr lang="de-CH" smtClean="0"/>
-              <a:t>24.07.2023</a:t>
+              <a:t>25.07.2023</a:t>
             </a:fld>
             <a:endParaRPr lang="de-CH"/>
           </a:p>
@@ -1172,7 +1234,7 @@
           <a:p>
             <a:fld id="{9E9B238C-2335-4007-98C9-471C02CC43B6}" type="datetimeFigureOut">
               <a:rPr lang="de-CH" smtClean="0"/>
-              <a:t>24.07.2023</a:t>
+              <a:t>25.07.2023</a:t>
             </a:fld>
             <a:endParaRPr lang="de-CH"/>
           </a:p>
@@ -1372,7 +1434,7 @@
           <a:p>
             <a:fld id="{9E9B238C-2335-4007-98C9-471C02CC43B6}" type="datetimeFigureOut">
               <a:rPr lang="de-CH" smtClean="0"/>
-              <a:t>24.07.2023</a:t>
+              <a:t>25.07.2023</a:t>
             </a:fld>
             <a:endParaRPr lang="de-CH"/>
           </a:p>
@@ -1582,7 +1644,7 @@
           <a:p>
             <a:fld id="{9E9B238C-2335-4007-98C9-471C02CC43B6}" type="datetimeFigureOut">
               <a:rPr lang="de-CH" smtClean="0"/>
-              <a:t>24.07.2023</a:t>
+              <a:t>25.07.2023</a:t>
             </a:fld>
             <a:endParaRPr lang="de-CH"/>
           </a:p>
@@ -2011,7 +2073,7 @@
           <a:p>
             <a:fld id="{9E9B238C-2335-4007-98C9-471C02CC43B6}" type="datetimeFigureOut">
               <a:rPr lang="de-CH" smtClean="0"/>
-              <a:t>24.07.2023</a:t>
+              <a:t>25.07.2023</a:t>
             </a:fld>
             <a:endParaRPr lang="de-CH"/>
           </a:p>
@@ -2287,7 +2349,7 @@
           <a:p>
             <a:fld id="{9E9B238C-2335-4007-98C9-471C02CC43B6}" type="datetimeFigureOut">
               <a:rPr lang="de-CH" smtClean="0"/>
-              <a:t>24.07.2023</a:t>
+              <a:t>25.07.2023</a:t>
             </a:fld>
             <a:endParaRPr lang="de-CH"/>
           </a:p>
@@ -2555,7 +2617,7 @@
           <a:p>
             <a:fld id="{9E9B238C-2335-4007-98C9-471C02CC43B6}" type="datetimeFigureOut">
               <a:rPr lang="de-CH" smtClean="0"/>
-              <a:t>24.07.2023</a:t>
+              <a:t>25.07.2023</a:t>
             </a:fld>
             <a:endParaRPr lang="de-CH"/>
           </a:p>
@@ -2970,7 +3032,7 @@
           <a:p>
             <a:fld id="{9E9B238C-2335-4007-98C9-471C02CC43B6}" type="datetimeFigureOut">
               <a:rPr lang="de-CH" smtClean="0"/>
-              <a:t>24.07.2023</a:t>
+              <a:t>25.07.2023</a:t>
             </a:fld>
             <a:endParaRPr lang="de-CH"/>
           </a:p>
@@ -3112,7 +3174,7 @@
           <a:p>
             <a:fld id="{9E9B238C-2335-4007-98C9-471C02CC43B6}" type="datetimeFigureOut">
               <a:rPr lang="de-CH" smtClean="0"/>
-              <a:t>24.07.2023</a:t>
+              <a:t>25.07.2023</a:t>
             </a:fld>
             <a:endParaRPr lang="de-CH"/>
           </a:p>
@@ -3225,7 +3287,7 @@
           <a:p>
             <a:fld id="{9E9B238C-2335-4007-98C9-471C02CC43B6}" type="datetimeFigureOut">
               <a:rPr lang="de-CH" smtClean="0"/>
-              <a:t>24.07.2023</a:t>
+              <a:t>25.07.2023</a:t>
             </a:fld>
             <a:endParaRPr lang="de-CH"/>
           </a:p>
@@ -3538,7 +3600,7 @@
           <a:p>
             <a:fld id="{9E9B238C-2335-4007-98C9-471C02CC43B6}" type="datetimeFigureOut">
               <a:rPr lang="de-CH" smtClean="0"/>
-              <a:t>24.07.2023</a:t>
+              <a:t>25.07.2023</a:t>
             </a:fld>
             <a:endParaRPr lang="de-CH"/>
           </a:p>
@@ -3827,7 +3889,7 @@
           <a:p>
             <a:fld id="{9E9B238C-2335-4007-98C9-471C02CC43B6}" type="datetimeFigureOut">
               <a:rPr lang="de-CH" smtClean="0"/>
-              <a:t>24.07.2023</a:t>
+              <a:t>25.07.2023</a:t>
             </a:fld>
             <a:endParaRPr lang="de-CH"/>
           </a:p>
@@ -4070,7 +4132,7 @@
           <a:p>
             <a:fld id="{9E9B238C-2335-4007-98C9-471C02CC43B6}" type="datetimeFigureOut">
               <a:rPr lang="de-CH" smtClean="0"/>
-              <a:t>24.07.2023</a:t>
+              <a:t>25.07.2023</a:t>
             </a:fld>
             <a:endParaRPr lang="de-CH"/>
           </a:p>
@@ -5190,8 +5252,8 @@
         </p:nvSpPr>
         <p:spPr>
           <a:xfrm>
-            <a:off x="11607800" y="6362700"/>
-            <a:ext cx="414338" cy="365125"/>
+            <a:off x="11496502" y="6362700"/>
+            <a:ext cx="525636" cy="365125"/>
           </a:xfrm>
         </p:spPr>
         <p:txBody>
@@ -5202,7 +5264,7 @@
               <a:rPr lang="en-US" sz="2200" smtClean="0"/>
               <a:t>11</a:t>
             </a:fld>
-            <a:endParaRPr lang="en-US" sz="2200"/>
+            <a:endParaRPr lang="en-US" sz="2200" dirty="0"/>
           </a:p>
         </p:txBody>
       </p:sp>
@@ -27008,7 +27070,7 @@
                   </a:schemeClr>
                 </a:solidFill>
               </a:rPr>
-              <a:t>Status and Next Steps</a:t>
+              <a:t>Status</a:t>
             </a:r>
           </a:p>
         </p:txBody>
@@ -27071,46 +27133,6 @@
             <a:r>
               <a:rPr lang="en-US" sz="2000" dirty="0"/>
               <a:t>Able to compare two YANG module revisions and determine which part of the semantics are not backward compatible</a:t>
-            </a:r>
-          </a:p>
-          <a:p>
-            <a:pPr marL="0" indent="0">
-              <a:buNone/>
-            </a:pPr>
-            <a:r>
-              <a:rPr lang="en-US" sz="2000" b="1" dirty="0"/>
-              <a:t>Next Step</a:t>
-            </a:r>
-          </a:p>
-          <a:p>
-            <a:r>
-              <a:rPr lang="en-US" sz="2000" dirty="0"/>
-              <a:t>Propose changes in netconf notification header </a:t>
-            </a:r>
-            <a:br>
-              <a:rPr lang="en-US" sz="2000" dirty="0"/>
-            </a:br>
-            <a:r>
-              <a:rPr lang="en-US" sz="2000" dirty="0"/>
-              <a:t>to validate properly in </a:t>
-            </a:r>
-            <a:r>
-              <a:rPr lang="en-US" sz="2000" dirty="0" err="1"/>
-              <a:t>libyang</a:t>
-            </a:r>
-            <a:endParaRPr lang="en-US" sz="2000" dirty="0"/>
-          </a:p>
-          <a:p>
-            <a:r>
-              <a:rPr lang="en-US" sz="2000" dirty="0"/>
-              <a:t>Enable schema validation and data serialization </a:t>
-            </a:r>
-            <a:br>
-              <a:rPr lang="en-US" sz="2000" dirty="0"/>
-            </a:br>
-            <a:r>
-              <a:rPr lang="en-US" sz="2000" dirty="0"/>
-              <a:t>in Apache Kafka</a:t>
             </a:r>
           </a:p>
         </p:txBody>
@@ -27836,6 +27858,12 @@
             <a:r>
               <a:rPr lang="en-US" sz="1800" dirty="0"/>
               <a:t>full message including the NETCONF and YANG push headers.</a:t>
+            </a:r>
+          </a:p>
+          <a:p>
+            <a:r>
+              <a:rPr lang="en-US" sz="1800" dirty="0"/>
+              <a:t>Validate and serialize message in Apache Kafka</a:t>
             </a:r>
           </a:p>
         </p:txBody>

</xml_diff>